<commit_message>
added an SFS and SNV by genome coordinates
</commit_message>
<xml_diff>
--- a/results/within-host-stock-synthetic-controls.pptx
+++ b/results/within-host-stock-synthetic-controls.pptx
@@ -5,21 +5,22 @@
     <p:sldMasterId id="2147483674" r:id="rId1"/>
   </p:sldMasterIdLst>
   <p:notesMasterIdLst>
-    <p:notesMasterId r:id="rId14"/>
+    <p:notesMasterId r:id="rId15"/>
   </p:notesMasterIdLst>
   <p:sldIdLst>
     <p:sldId id="256" r:id="rId2"/>
     <p:sldId id="1000" r:id="rId3"/>
     <p:sldId id="995" r:id="rId4"/>
-    <p:sldId id="996" r:id="rId5"/>
-    <p:sldId id="997" r:id="rId6"/>
-    <p:sldId id="998" r:id="rId7"/>
-    <p:sldId id="999" r:id="rId8"/>
-    <p:sldId id="1001" r:id="rId9"/>
-    <p:sldId id="1002" r:id="rId10"/>
-    <p:sldId id="1003" r:id="rId11"/>
-    <p:sldId id="1004" r:id="rId12"/>
-    <p:sldId id="1005" r:id="rId13"/>
+    <p:sldId id="1018" r:id="rId5"/>
+    <p:sldId id="996" r:id="rId6"/>
+    <p:sldId id="997" r:id="rId7"/>
+    <p:sldId id="998" r:id="rId8"/>
+    <p:sldId id="999" r:id="rId9"/>
+    <p:sldId id="1001" r:id="rId10"/>
+    <p:sldId id="1002" r:id="rId11"/>
+    <p:sldId id="1003" r:id="rId12"/>
+    <p:sldId id="1004" r:id="rId13"/>
+    <p:sldId id="1005" r:id="rId14"/>
   </p:sldIdLst>
   <p:sldSz cx="12192000" cy="6858000"/>
   <p:notesSz cx="6858000" cy="9144000"/>
@@ -118,6 +119,11 @@
       </a:defRPr>
     </a:lvl9pPr>
   </p:defaultTextStyle>
+  <p:extLst>
+    <p:ext uri="{EFAFB233-063F-42B5-8137-9DF3F51BA10A}">
+      <p15:sldGuideLst xmlns:p15="http://schemas.microsoft.com/office/powerpoint/2012/main"/>
+    </p:ext>
+  </p:extLst>
 </p:presentation>
 </file>
 
@@ -203,7 +209,7 @@
           <a:p>
             <a:fld id="{D6EAD439-CC95-944F-A084-354E9442AA61}" type="datetimeFigureOut">
               <a:rPr lang="en-US" smtClean="0"/>
-              <a:t>7/22/25</a:t>
+              <a:t>8/7/25</a:t>
             </a:fld>
             <a:endParaRPr lang="en-US"/>
           </a:p>
@@ -538,7 +544,7 @@
           <a:p>
             <a:fld id="{3BA78321-60EB-1E42-810F-4E97726F65E5}" type="slidenum">
               <a:rPr lang="en-US" smtClean="0"/>
-              <a:t>6</a:t>
+              <a:t>7</a:t>
             </a:fld>
             <a:endParaRPr lang="en-US"/>
           </a:p>
@@ -622,7 +628,7 @@
           <a:p>
             <a:fld id="{310530BC-D414-D145-B0A4-A4A0B5906CC6}" type="slidenum">
               <a:rPr lang="en-US" smtClean="0"/>
-              <a:t>12</a:t>
+              <a:t>13</a:t>
             </a:fld>
             <a:endParaRPr lang="en-US"/>
           </a:p>
@@ -788,7 +794,7 @@
           <a:p>
             <a:fld id="{6444479B-705B-4489-957E-7E8A228BDFA0}" type="datetime1">
               <a:rPr lang="en-US" smtClean="0"/>
-              <a:t>7/22/25</a:t>
+              <a:t>8/7/25</a:t>
             </a:fld>
             <a:endParaRPr lang="en-US"/>
           </a:p>
@@ -986,7 +992,7 @@
           <a:p>
             <a:fld id="{C07B66AD-7C08-490A-ADA4-B47E10FB2407}" type="datetime1">
               <a:rPr lang="en-US" smtClean="0"/>
-              <a:t>7/22/25</a:t>
+              <a:t>8/7/25</a:t>
             </a:fld>
             <a:endParaRPr lang="en-US"/>
           </a:p>
@@ -1194,7 +1200,7 @@
           <a:p>
             <a:fld id="{05B95027-4255-49E7-9841-CD21BCC99996}" type="datetime1">
               <a:rPr lang="en-US" smtClean="0"/>
-              <a:t>7/22/25</a:t>
+              <a:t>8/7/25</a:t>
             </a:fld>
             <a:endParaRPr lang="en-US"/>
           </a:p>
@@ -1392,7 +1398,7 @@
           <a:p>
             <a:fld id="{9F89F774-3FA6-43B8-9241-99959C8FD463}" type="datetime1">
               <a:rPr lang="en-US" smtClean="0"/>
-              <a:t>7/22/25</a:t>
+              <a:t>8/7/25</a:t>
             </a:fld>
             <a:endParaRPr lang="en-US"/>
           </a:p>
@@ -1667,7 +1673,7 @@
           <a:p>
             <a:fld id="{F9504452-5DCC-4FE2-A5C9-8A5EF6714D65}" type="datetime1">
               <a:rPr lang="en-US" smtClean="0"/>
-              <a:t>7/22/25</a:t>
+              <a:t>8/7/25</a:t>
             </a:fld>
             <a:endParaRPr lang="en-US"/>
           </a:p>
@@ -1932,7 +1938,7 @@
           <a:p>
             <a:fld id="{E579ABC2-0180-4F3A-A895-A85BC724D472}" type="datetime1">
               <a:rPr lang="en-US" smtClean="0"/>
-              <a:t>7/22/25</a:t>
+              <a:t>8/7/25</a:t>
             </a:fld>
             <a:endParaRPr lang="en-US"/>
           </a:p>
@@ -2344,7 +2350,7 @@
           <a:p>
             <a:fld id="{6AEEA9BA-4E8F-439E-BEA4-91FBA01E3F5F}" type="datetime1">
               <a:rPr lang="en-US" smtClean="0"/>
-              <a:t>7/22/25</a:t>
+              <a:t>8/7/25</a:t>
             </a:fld>
             <a:endParaRPr lang="en-US"/>
           </a:p>
@@ -2485,7 +2491,7 @@
           <a:p>
             <a:fld id="{BE15BF18-0007-481C-AA29-413124BC3EE7}" type="datetime1">
               <a:rPr lang="en-US" smtClean="0"/>
-              <a:t>7/22/25</a:t>
+              <a:t>8/7/25</a:t>
             </a:fld>
             <a:endParaRPr lang="en-US"/>
           </a:p>
@@ -2598,7 +2604,7 @@
           <a:p>
             <a:fld id="{09BE9870-3748-43AD-B547-02A075CB4A1D}" type="datetime1">
               <a:rPr lang="en-US" smtClean="0"/>
-              <a:t>7/22/25</a:t>
+              <a:t>8/7/25</a:t>
             </a:fld>
             <a:endParaRPr lang="en-US"/>
           </a:p>
@@ -2909,7 +2915,7 @@
           <a:p>
             <a:fld id="{558E7897-33C5-4F1A-9307-D068E37F3DC7}" type="datetime1">
               <a:rPr lang="en-US" smtClean="0"/>
-              <a:t>7/22/25</a:t>
+              <a:t>8/7/25</a:t>
             </a:fld>
             <a:endParaRPr lang="en-US"/>
           </a:p>
@@ -3197,7 +3203,7 @@
           <a:p>
             <a:fld id="{82E171BA-CC09-47C8-A6DF-F5C5CB59CEEC}" type="datetime1">
               <a:rPr lang="en-US" smtClean="0"/>
-              <a:t>7/22/25</a:t>
+              <a:t>8/7/25</a:t>
             </a:fld>
             <a:endParaRPr lang="en-US"/>
           </a:p>
@@ -3438,7 +3444,7 @@
           <a:p>
             <a:fld id="{7DA38F49-B3E2-4BF0-BEC7-C30D34ABBB8D}" type="datetime1">
               <a:rPr lang="en-US" smtClean="0"/>
-              <a:t>7/22/25</a:t>
+              <a:t>8/7/25</a:t>
             </a:fld>
             <a:endParaRPr lang="en-US"/>
           </a:p>
@@ -4093,12 +4099,47 @@
           <a:chExt cx="0" cy="0"/>
         </a:xfrm>
       </p:grpSpPr>
+      <p:sp>
+        <p:nvSpPr>
+          <p:cNvPr id="5" name="TextBox 4">
+            <a:extLst>
+              <a:ext uri="{FF2B5EF4-FFF2-40B4-BE49-F238E27FC236}">
+                <a16:creationId xmlns:a16="http://schemas.microsoft.com/office/drawing/2014/main" id="{BFE05C8A-ACDE-B4F9-B859-E350447D6B9C}"/>
+              </a:ext>
+            </a:extLst>
+          </p:cNvPr>
+          <p:cNvSpPr txBox="1"/>
+          <p:nvPr/>
+        </p:nvSpPr>
+        <p:spPr>
+          <a:xfrm>
+            <a:off x="6391835" y="269933"/>
+            <a:ext cx="2877670" cy="369332"/>
+          </a:xfrm>
+          <a:prstGeom prst="rect">
+            <a:avLst/>
+          </a:prstGeom>
+          <a:noFill/>
+        </p:spPr>
+        <p:txBody>
+          <a:bodyPr wrap="square" rtlCol="0">
+            <a:spAutoFit/>
+          </a:bodyPr>
+          <a:lstStyle/>
+          <a:p>
+            <a:r>
+              <a:rPr lang="en-US" dirty="0"/>
+              <a:t>in stock viruses</a:t>
+            </a:r>
+          </a:p>
+        </p:txBody>
+      </p:sp>
       <p:pic>
         <p:nvPicPr>
-          <p:cNvPr id="4" name="Picture 3">
-            <a:extLst>
-              <a:ext uri="{FF2B5EF4-FFF2-40B4-BE49-F238E27FC236}">
-                <a16:creationId xmlns:a16="http://schemas.microsoft.com/office/drawing/2014/main" id="{5EF37951-5D99-3477-3A29-C7BEB3A0D090}"/>
+          <p:cNvPr id="6" name="Picture 5">
+            <a:extLst>
+              <a:ext uri="{FF2B5EF4-FFF2-40B4-BE49-F238E27FC236}">
+                <a16:creationId xmlns:a16="http://schemas.microsoft.com/office/drawing/2014/main" id="{40958DC1-A7A5-30C0-FB27-3F962EC1DF0A}"/>
               </a:ext>
             </a:extLst>
           </p:cNvPr>
@@ -4115,8 +4156,8 @@
         </p:blipFill>
         <p:spPr>
           <a:xfrm>
-            <a:off x="3272118" y="729640"/>
-            <a:ext cx="7772400" cy="5447323"/>
+            <a:off x="2989730" y="646450"/>
+            <a:ext cx="7772400" cy="5941617"/>
           </a:xfrm>
           <a:prstGeom prst="rect">
             <a:avLst/>
@@ -4125,10 +4166,10 @@
       </p:pic>
       <p:sp>
         <p:nvSpPr>
-          <p:cNvPr id="5" name="TextBox 4">
-            <a:extLst>
-              <a:ext uri="{FF2B5EF4-FFF2-40B4-BE49-F238E27FC236}">
-                <a16:creationId xmlns:a16="http://schemas.microsoft.com/office/drawing/2014/main" id="{E31B82F4-DD3C-1EC6-0822-3E292A5839B7}"/>
+          <p:cNvPr id="7" name="TextBox 6">
+            <a:extLst>
+              <a:ext uri="{FF2B5EF4-FFF2-40B4-BE49-F238E27FC236}">
+                <a16:creationId xmlns:a16="http://schemas.microsoft.com/office/drawing/2014/main" id="{D935E72B-5A27-4DCC-2676-E8B8CC35BB2C}"/>
               </a:ext>
             </a:extLst>
           </p:cNvPr>
@@ -4137,8 +4178,8 @@
         </p:nvSpPr>
         <p:spPr>
           <a:xfrm>
-            <a:off x="838200" y="3012140"/>
-            <a:ext cx="1891553" cy="1200329"/>
+            <a:off x="524435" y="2878594"/>
+            <a:ext cx="2299447" cy="1477328"/>
           </a:xfrm>
           <a:prstGeom prst="rect">
             <a:avLst/>
@@ -4153,42 +4194,23 @@
           <a:p>
             <a:r>
               <a:rPr lang="en-US" dirty="0"/>
-              <a:t>Same plot as last slide but with shared variants as well</a:t>
-            </a:r>
-          </a:p>
-        </p:txBody>
-      </p:sp>
-      <p:sp>
-        <p:nvSpPr>
-          <p:cNvPr id="6" name="TextBox 5">
-            <a:extLst>
-              <a:ext uri="{FF2B5EF4-FFF2-40B4-BE49-F238E27FC236}">
-                <a16:creationId xmlns:a16="http://schemas.microsoft.com/office/drawing/2014/main" id="{5189A9C4-832E-30D0-8C26-3B6EC26A2113}"/>
-              </a:ext>
-            </a:extLst>
-          </p:cNvPr>
-          <p:cNvSpPr txBox="1"/>
-          <p:nvPr/>
-        </p:nvSpPr>
-        <p:spPr>
-          <a:xfrm>
-            <a:off x="6391835" y="269933"/>
-            <a:ext cx="2877670" cy="369332"/>
-          </a:xfrm>
-          <a:prstGeom prst="rect">
-            <a:avLst/>
-          </a:prstGeom>
-          <a:noFill/>
-        </p:spPr>
-        <p:txBody>
-          <a:bodyPr wrap="square" rtlCol="0">
-            <a:spAutoFit/>
-          </a:bodyPr>
-          <a:lstStyle/>
-          <a:p>
+              <a:t>As </a:t>
+            </a:r>
+            <a:r>
+              <a:rPr lang="en-US" dirty="0" err="1"/>
+              <a:t>ct</a:t>
+            </a:r>
             <a:r>
               <a:rPr lang="en-US" dirty="0"/>
-              <a:t>in stock viruses</a:t>
+              <a:t> values go up, number of single variants goes up (except for last </a:t>
+            </a:r>
+            <a:r>
+              <a:rPr lang="en-US" dirty="0" err="1"/>
+              <a:t>ct</a:t>
+            </a:r>
+            <a:r>
+              <a:rPr lang="en-US" dirty="0"/>
+              <a:t> value)</a:t>
             </a:r>
           </a:p>
         </p:txBody>
@@ -4196,7 +4218,7 @@
     </p:spTree>
     <p:extLst>
       <p:ext uri="{BB962C8B-B14F-4D97-AF65-F5344CB8AC3E}">
-        <p14:creationId xmlns:p14="http://schemas.microsoft.com/office/powerpoint/2010/main" val="3135660678"/>
+        <p14:creationId xmlns:p14="http://schemas.microsoft.com/office/powerpoint/2010/main" val="1363901422"/>
       </p:ext>
     </p:extLst>
   </p:cSld>
@@ -4228,6 +4250,136 @@
           <p:cNvPr id="4" name="Picture 3">
             <a:extLst>
               <a:ext uri="{FF2B5EF4-FFF2-40B4-BE49-F238E27FC236}">
+                <a16:creationId xmlns:a16="http://schemas.microsoft.com/office/drawing/2014/main" id="{5EF37951-5D99-3477-3A29-C7BEB3A0D090}"/>
+              </a:ext>
+            </a:extLst>
+          </p:cNvPr>
+          <p:cNvPicPr>
+            <a:picLocks noChangeAspect="1"/>
+          </p:cNvPicPr>
+          <p:nvPr/>
+        </p:nvPicPr>
+        <p:blipFill>
+          <a:blip r:embed="rId2"/>
+          <a:stretch>
+            <a:fillRect/>
+          </a:stretch>
+        </p:blipFill>
+        <p:spPr>
+          <a:xfrm>
+            <a:off x="3272118" y="729640"/>
+            <a:ext cx="7772400" cy="5447323"/>
+          </a:xfrm>
+          <a:prstGeom prst="rect">
+            <a:avLst/>
+          </a:prstGeom>
+        </p:spPr>
+      </p:pic>
+      <p:sp>
+        <p:nvSpPr>
+          <p:cNvPr id="5" name="TextBox 4">
+            <a:extLst>
+              <a:ext uri="{FF2B5EF4-FFF2-40B4-BE49-F238E27FC236}">
+                <a16:creationId xmlns:a16="http://schemas.microsoft.com/office/drawing/2014/main" id="{E31B82F4-DD3C-1EC6-0822-3E292A5839B7}"/>
+              </a:ext>
+            </a:extLst>
+          </p:cNvPr>
+          <p:cNvSpPr txBox="1"/>
+          <p:nvPr/>
+        </p:nvSpPr>
+        <p:spPr>
+          <a:xfrm>
+            <a:off x="838200" y="3012140"/>
+            <a:ext cx="1891553" cy="1200329"/>
+          </a:xfrm>
+          <a:prstGeom prst="rect">
+            <a:avLst/>
+          </a:prstGeom>
+          <a:noFill/>
+        </p:spPr>
+        <p:txBody>
+          <a:bodyPr wrap="square" rtlCol="0">
+            <a:spAutoFit/>
+          </a:bodyPr>
+          <a:lstStyle/>
+          <a:p>
+            <a:r>
+              <a:rPr lang="en-US" dirty="0"/>
+              <a:t>Same plot as last slide but with shared variants as well</a:t>
+            </a:r>
+          </a:p>
+        </p:txBody>
+      </p:sp>
+      <p:sp>
+        <p:nvSpPr>
+          <p:cNvPr id="6" name="TextBox 5">
+            <a:extLst>
+              <a:ext uri="{FF2B5EF4-FFF2-40B4-BE49-F238E27FC236}">
+                <a16:creationId xmlns:a16="http://schemas.microsoft.com/office/drawing/2014/main" id="{5189A9C4-832E-30D0-8C26-3B6EC26A2113}"/>
+              </a:ext>
+            </a:extLst>
+          </p:cNvPr>
+          <p:cNvSpPr txBox="1"/>
+          <p:nvPr/>
+        </p:nvSpPr>
+        <p:spPr>
+          <a:xfrm>
+            <a:off x="6391835" y="269933"/>
+            <a:ext cx="2877670" cy="369332"/>
+          </a:xfrm>
+          <a:prstGeom prst="rect">
+            <a:avLst/>
+          </a:prstGeom>
+          <a:noFill/>
+        </p:spPr>
+        <p:txBody>
+          <a:bodyPr wrap="square" rtlCol="0">
+            <a:spAutoFit/>
+          </a:bodyPr>
+          <a:lstStyle/>
+          <a:p>
+            <a:r>
+              <a:rPr lang="en-US" dirty="0"/>
+              <a:t>in stock viruses</a:t>
+            </a:r>
+          </a:p>
+        </p:txBody>
+      </p:sp>
+    </p:spTree>
+    <p:extLst>
+      <p:ext uri="{BB962C8B-B14F-4D97-AF65-F5344CB8AC3E}">
+        <p14:creationId xmlns:p14="http://schemas.microsoft.com/office/powerpoint/2010/main" val="3135660678"/>
+      </p:ext>
+    </p:extLst>
+  </p:cSld>
+  <p:clrMapOvr>
+    <a:masterClrMapping/>
+  </p:clrMapOvr>
+</p:sld>
+</file>
+
+<file path=ppt/slides/slide12.xml><?xml version="1.0" encoding="utf-8"?>
+<p:sld xmlns:a="http://schemas.openxmlformats.org/drawingml/2006/main" xmlns:r="http://schemas.openxmlformats.org/officeDocument/2006/relationships" xmlns:p="http://schemas.openxmlformats.org/presentationml/2006/main">
+  <p:cSld>
+    <p:spTree>
+      <p:nvGrpSpPr>
+        <p:cNvPr id="1" name=""/>
+        <p:cNvGrpSpPr/>
+        <p:nvPr/>
+      </p:nvGrpSpPr>
+      <p:grpSpPr>
+        <a:xfrm>
+          <a:off x="0" y="0"/>
+          <a:ext cx="0" cy="0"/>
+          <a:chOff x="0" y="0"/>
+          <a:chExt cx="0" cy="0"/>
+        </a:xfrm>
+      </p:grpSpPr>
+      <p:pic>
+        <p:nvPicPr>
+          <p:cNvPr id="4" name="Picture 3">
+            <a:extLst>
+              <a:ext uri="{FF2B5EF4-FFF2-40B4-BE49-F238E27FC236}">
                 <a16:creationId xmlns:a16="http://schemas.microsoft.com/office/drawing/2014/main" id="{2734FE1D-5AAE-3DE0-FB45-1822F79328B6}"/>
               </a:ext>
             </a:extLst>
@@ -4410,7 +4562,7 @@
 </p:sld>
 </file>
 
-<file path=ppt/slides/slide12.xml><?xml version="1.0" encoding="utf-8"?>
+<file path=ppt/slides/slide13.xml><?xml version="1.0" encoding="utf-8"?>
 <p:sld xmlns:a="http://schemas.openxmlformats.org/drawingml/2006/main" xmlns:r="http://schemas.openxmlformats.org/officeDocument/2006/relationships" xmlns:p="http://schemas.openxmlformats.org/presentationml/2006/main">
   <p:cSld>
     <p:spTree>
@@ -4587,7 +4739,7 @@
         </p:nvSpPr>
         <p:spPr>
           <a:xfrm>
-            <a:off x="2097741" y="3939988"/>
+            <a:off x="1520798" y="2688130"/>
             <a:ext cx="2232212" cy="1200329"/>
           </a:xfrm>
           <a:prstGeom prst="rect">
@@ -4759,7 +4911,7 @@
           <p:cNvPr id="4" name="Picture 3">
             <a:extLst>
               <a:ext uri="{FF2B5EF4-FFF2-40B4-BE49-F238E27FC236}">
-                <a16:creationId xmlns:a16="http://schemas.microsoft.com/office/drawing/2014/main" id="{41563691-4A31-4EEA-0F2A-9BCA529599F3}"/>
+                <a16:creationId xmlns:a16="http://schemas.microsoft.com/office/drawing/2014/main" id="{57BD3C61-7E7C-8DE8-AFEB-1C1E93B5AA86}"/>
               </a:ext>
             </a:extLst>
           </p:cNvPr>
@@ -4776,20 +4928,50 @@
         </p:blipFill>
         <p:spPr>
           <a:xfrm>
-            <a:off x="3823447" y="653957"/>
-            <a:ext cx="7772400" cy="5550086"/>
+            <a:off x="2209800" y="551432"/>
+            <a:ext cx="7772400" cy="5755135"/>
           </a:xfrm>
           <a:prstGeom prst="rect">
             <a:avLst/>
           </a:prstGeom>
         </p:spPr>
       </p:pic>
+      <p:pic>
+        <p:nvPicPr>
+          <p:cNvPr id="5" name="Picture 4">
+            <a:extLst>
+              <a:ext uri="{FF2B5EF4-FFF2-40B4-BE49-F238E27FC236}">
+                <a16:creationId xmlns:a16="http://schemas.microsoft.com/office/drawing/2014/main" id="{CBF3E1F2-7B55-B97E-47D9-A6F8CA55F665}"/>
+              </a:ext>
+            </a:extLst>
+          </p:cNvPr>
+          <p:cNvPicPr>
+            <a:picLocks noChangeAspect="1"/>
+          </p:cNvPicPr>
+          <p:nvPr/>
+        </p:nvPicPr>
+        <p:blipFill>
+          <a:blip r:embed="rId3"/>
+          <a:stretch>
+            <a:fillRect/>
+          </a:stretch>
+        </p:blipFill>
+        <p:spPr>
+          <a:xfrm>
+            <a:off x="6655594" y="3959226"/>
+            <a:ext cx="1651000" cy="812800"/>
+          </a:xfrm>
+          <a:prstGeom prst="rect">
+            <a:avLst/>
+          </a:prstGeom>
+        </p:spPr>
+      </p:pic>
       <p:sp>
         <p:nvSpPr>
           <p:cNvPr id="2" name="TextBox 1">
             <a:extLst>
               <a:ext uri="{FF2B5EF4-FFF2-40B4-BE49-F238E27FC236}">
-                <a16:creationId xmlns:a16="http://schemas.microsoft.com/office/drawing/2014/main" id="{8CE8FA0C-0366-6848-2EDD-4166B4D53AE4}"/>
+                <a16:creationId xmlns:a16="http://schemas.microsoft.com/office/drawing/2014/main" id="{F820382F-9872-5E8B-F40C-8BC23EA1998F}"/>
               </a:ext>
             </a:extLst>
           </p:cNvPr>
@@ -4798,8 +4980,8 @@
         </p:nvSpPr>
         <p:spPr>
           <a:xfrm>
-            <a:off x="914400" y="2228671"/>
-            <a:ext cx="2286000" cy="2862322"/>
+            <a:off x="4064794" y="97971"/>
+            <a:ext cx="4371635" cy="369332"/>
           </a:xfrm>
           <a:prstGeom prst="rect">
             <a:avLst/>
@@ -4814,24 +4996,7 @@
           <a:p>
             <a:r>
               <a:rPr lang="en-US" dirty="0"/>
-              <a:t>No shared variants between synthetic control reps = GOOD!</a:t>
-            </a:r>
-          </a:p>
-          <a:p>
-            <a:endParaRPr lang="en-US" dirty="0"/>
-          </a:p>
-          <a:p>
-            <a:r>
-              <a:rPr lang="en-US" dirty="0"/>
-              <a:t>However, higher frequency single variants seem to belong </a:t>
-            </a:r>
-            <a:r>
-              <a:rPr lang="en-US"/>
-              <a:t>to samples </a:t>
-            </a:r>
-            <a:r>
-              <a:rPr lang="en-US" dirty="0"/>
-              <a:t>with lower dilutions</a:t>
+              <a:t>Shared SNVs between reps by gene</a:t>
             </a:r>
           </a:p>
         </p:txBody>
@@ -4839,7 +5004,7 @@
     </p:spTree>
     <p:extLst>
       <p:ext uri="{BB962C8B-B14F-4D97-AF65-F5344CB8AC3E}">
-        <p14:creationId xmlns:p14="http://schemas.microsoft.com/office/powerpoint/2010/main" val="2197642790"/>
+        <p14:creationId xmlns:p14="http://schemas.microsoft.com/office/powerpoint/2010/main" val="1545065449"/>
       </p:ext>
     </p:extLst>
   </p:cSld>
@@ -4871,7 +5036,7 @@
           <p:cNvPr id="4" name="Picture 3">
             <a:extLst>
               <a:ext uri="{FF2B5EF4-FFF2-40B4-BE49-F238E27FC236}">
-                <a16:creationId xmlns:a16="http://schemas.microsoft.com/office/drawing/2014/main" id="{DDCC9D7B-5C84-9F50-60BB-514072DD3E7E}"/>
+                <a16:creationId xmlns:a16="http://schemas.microsoft.com/office/drawing/2014/main" id="{41563691-4A31-4EEA-0F2A-9BCA529599F3}"/>
               </a:ext>
             </a:extLst>
           </p:cNvPr>
@@ -4888,50 +5053,20 @@
         </p:blipFill>
         <p:spPr>
           <a:xfrm>
-            <a:off x="4588096" y="254244"/>
-            <a:ext cx="3015807" cy="1971874"/>
+            <a:off x="3823447" y="653957"/>
+            <a:ext cx="7772400" cy="5550086"/>
           </a:xfrm>
           <a:prstGeom prst="rect">
             <a:avLst/>
           </a:prstGeom>
         </p:spPr>
       </p:pic>
-      <p:pic>
-        <p:nvPicPr>
-          <p:cNvPr id="7" name="Picture 6">
-            <a:extLst>
-              <a:ext uri="{FF2B5EF4-FFF2-40B4-BE49-F238E27FC236}">
-                <a16:creationId xmlns:a16="http://schemas.microsoft.com/office/drawing/2014/main" id="{65F1217D-3C9B-CF29-C902-038D82A385D8}"/>
-              </a:ext>
-            </a:extLst>
-          </p:cNvPr>
-          <p:cNvPicPr>
-            <a:picLocks noChangeAspect="1"/>
-          </p:cNvPicPr>
-          <p:nvPr/>
-        </p:nvPicPr>
-        <p:blipFill>
-          <a:blip r:embed="rId3"/>
-          <a:stretch>
-            <a:fillRect/>
-          </a:stretch>
-        </p:blipFill>
-        <p:spPr>
-          <a:xfrm>
-            <a:off x="6914570" y="3060456"/>
-            <a:ext cx="3225800" cy="3543300"/>
-          </a:xfrm>
-          <a:prstGeom prst="rect">
-            <a:avLst/>
-          </a:prstGeom>
-        </p:spPr>
-      </p:pic>
-      <p:sp>
-        <p:nvSpPr>
-          <p:cNvPr id="8" name="TextBox 7">
-            <a:extLst>
-              <a:ext uri="{FF2B5EF4-FFF2-40B4-BE49-F238E27FC236}">
-                <a16:creationId xmlns:a16="http://schemas.microsoft.com/office/drawing/2014/main" id="{F665738D-5D5B-FF50-203B-FCF7A2ECBD3B}"/>
+      <p:sp>
+        <p:nvSpPr>
+          <p:cNvPr id="2" name="TextBox 1">
+            <a:extLst>
+              <a:ext uri="{FF2B5EF4-FFF2-40B4-BE49-F238E27FC236}">
+                <a16:creationId xmlns:a16="http://schemas.microsoft.com/office/drawing/2014/main" id="{8CE8FA0C-0366-6848-2EDD-4166B4D53AE4}"/>
               </a:ext>
             </a:extLst>
           </p:cNvPr>
@@ -4940,8 +5075,8 @@
         </p:nvSpPr>
         <p:spPr>
           <a:xfrm>
-            <a:off x="7737759" y="2590800"/>
-            <a:ext cx="789711" cy="369332"/>
+            <a:off x="914400" y="2228671"/>
+            <a:ext cx="2286000" cy="2862322"/>
           </a:xfrm>
           <a:prstGeom prst="rect">
             <a:avLst/>
@@ -4956,80 +5091,32 @@
           <a:p>
             <a:r>
               <a:rPr lang="en-US" dirty="0"/>
-              <a:t>stock</a:t>
-            </a:r>
-          </a:p>
-        </p:txBody>
-      </p:sp>
-      <p:sp>
-        <p:nvSpPr>
-          <p:cNvPr id="9" name="TextBox 8">
-            <a:extLst>
-              <a:ext uri="{FF2B5EF4-FFF2-40B4-BE49-F238E27FC236}">
-                <a16:creationId xmlns:a16="http://schemas.microsoft.com/office/drawing/2014/main" id="{6C680BFA-7520-108B-87D5-B76B0E1D057E}"/>
-              </a:ext>
-            </a:extLst>
-          </p:cNvPr>
-          <p:cNvSpPr txBox="1"/>
-          <p:nvPr/>
-        </p:nvSpPr>
-        <p:spPr>
-          <a:xfrm>
-            <a:off x="2698376" y="2590800"/>
-            <a:ext cx="789711" cy="369332"/>
-          </a:xfrm>
-          <a:prstGeom prst="rect">
-            <a:avLst/>
-          </a:prstGeom>
-          <a:noFill/>
-        </p:spPr>
-        <p:txBody>
-          <a:bodyPr wrap="square" rtlCol="0">
-            <a:spAutoFit/>
-          </a:bodyPr>
-          <a:lstStyle/>
+              <a:t>No shared variants between synthetic control reps = GOOD!</a:t>
+            </a:r>
+          </a:p>
+          <a:p>
+            <a:endParaRPr lang="en-US" dirty="0"/>
+          </a:p>
           <a:p>
             <a:r>
               <a:rPr lang="en-US" dirty="0"/>
-              <a:t>syn</a:t>
-            </a:r>
-          </a:p>
-        </p:txBody>
-      </p:sp>
-      <p:pic>
-        <p:nvPicPr>
-          <p:cNvPr id="10" name="Picture 9">
-            <a:extLst>
-              <a:ext uri="{FF2B5EF4-FFF2-40B4-BE49-F238E27FC236}">
-                <a16:creationId xmlns:a16="http://schemas.microsoft.com/office/drawing/2014/main" id="{9FE0576C-CC03-8F06-D0B9-83A0D41700A5}"/>
-              </a:ext>
-            </a:extLst>
-          </p:cNvPr>
-          <p:cNvPicPr>
-            <a:picLocks noChangeAspect="1"/>
-          </p:cNvPicPr>
-          <p:nvPr/>
-        </p:nvPicPr>
-        <p:blipFill>
-          <a:blip r:embed="rId4"/>
-          <a:stretch>
-            <a:fillRect/>
-          </a:stretch>
-        </p:blipFill>
-        <p:spPr>
-          <a:xfrm>
-            <a:off x="1721431" y="3196421"/>
-            <a:ext cx="3556000" cy="2654300"/>
-          </a:xfrm>
-          <a:prstGeom prst="rect">
-            <a:avLst/>
-          </a:prstGeom>
-        </p:spPr>
-      </p:pic>
+              <a:t>However, higher frequency single variants seem to belong </a:t>
+            </a:r>
+            <a:r>
+              <a:rPr lang="en-US"/>
+              <a:t>to samples </a:t>
+            </a:r>
+            <a:r>
+              <a:rPr lang="en-US" dirty="0"/>
+              <a:t>with lower dilutions</a:t>
+            </a:r>
+          </a:p>
+        </p:txBody>
+      </p:sp>
     </p:spTree>
     <p:extLst>
       <p:ext uri="{BB962C8B-B14F-4D97-AF65-F5344CB8AC3E}">
-        <p14:creationId xmlns:p14="http://schemas.microsoft.com/office/powerpoint/2010/main" val="3292517074"/>
+        <p14:creationId xmlns:p14="http://schemas.microsoft.com/office/powerpoint/2010/main" val="2197642790"/>
       </p:ext>
     </p:extLst>
   </p:cSld>
@@ -5061,7 +5148,37 @@
           <p:cNvPr id="4" name="Picture 3">
             <a:extLst>
               <a:ext uri="{FF2B5EF4-FFF2-40B4-BE49-F238E27FC236}">
-                <a16:creationId xmlns:a16="http://schemas.microsoft.com/office/drawing/2014/main" id="{D110D539-20FB-E86E-B3C6-F408686586EE}"/>
+                <a16:creationId xmlns:a16="http://schemas.microsoft.com/office/drawing/2014/main" id="{DDCC9D7B-5C84-9F50-60BB-514072DD3E7E}"/>
+              </a:ext>
+            </a:extLst>
+          </p:cNvPr>
+          <p:cNvPicPr>
+            <a:picLocks noChangeAspect="1"/>
+          </p:cNvPicPr>
+          <p:nvPr/>
+        </p:nvPicPr>
+        <p:blipFill>
+          <a:blip r:embed="rId2"/>
+          <a:stretch>
+            <a:fillRect/>
+          </a:stretch>
+        </p:blipFill>
+        <p:spPr>
+          <a:xfrm>
+            <a:off x="4588096" y="254244"/>
+            <a:ext cx="3015807" cy="1971874"/>
+          </a:xfrm>
+          <a:prstGeom prst="rect">
+            <a:avLst/>
+          </a:prstGeom>
+        </p:spPr>
+      </p:pic>
+      <p:pic>
+        <p:nvPicPr>
+          <p:cNvPr id="7" name="Picture 6">
+            <a:extLst>
+              <a:ext uri="{FF2B5EF4-FFF2-40B4-BE49-F238E27FC236}">
+                <a16:creationId xmlns:a16="http://schemas.microsoft.com/office/drawing/2014/main" id="{65F1217D-3C9B-CF29-C902-038D82A385D8}"/>
               </a:ext>
             </a:extLst>
           </p:cNvPr>
@@ -5078,20 +5195,90 @@
         </p:blipFill>
         <p:spPr>
           <a:xfrm>
-            <a:off x="0" y="584563"/>
-            <a:ext cx="5747904" cy="4598323"/>
+            <a:off x="6914570" y="3060456"/>
+            <a:ext cx="3225800" cy="3543300"/>
           </a:xfrm>
           <a:prstGeom prst="rect">
             <a:avLst/>
           </a:prstGeom>
         </p:spPr>
       </p:pic>
+      <p:sp>
+        <p:nvSpPr>
+          <p:cNvPr id="8" name="TextBox 7">
+            <a:extLst>
+              <a:ext uri="{FF2B5EF4-FFF2-40B4-BE49-F238E27FC236}">
+                <a16:creationId xmlns:a16="http://schemas.microsoft.com/office/drawing/2014/main" id="{F665738D-5D5B-FF50-203B-FCF7A2ECBD3B}"/>
+              </a:ext>
+            </a:extLst>
+          </p:cNvPr>
+          <p:cNvSpPr txBox="1"/>
+          <p:nvPr/>
+        </p:nvSpPr>
+        <p:spPr>
+          <a:xfrm>
+            <a:off x="7737759" y="2590800"/>
+            <a:ext cx="789711" cy="369332"/>
+          </a:xfrm>
+          <a:prstGeom prst="rect">
+            <a:avLst/>
+          </a:prstGeom>
+          <a:noFill/>
+        </p:spPr>
+        <p:txBody>
+          <a:bodyPr wrap="square" rtlCol="0">
+            <a:spAutoFit/>
+          </a:bodyPr>
+          <a:lstStyle/>
+          <a:p>
+            <a:r>
+              <a:rPr lang="en-US" dirty="0"/>
+              <a:t>stock</a:t>
+            </a:r>
+          </a:p>
+        </p:txBody>
+      </p:sp>
+      <p:sp>
+        <p:nvSpPr>
+          <p:cNvPr id="9" name="TextBox 8">
+            <a:extLst>
+              <a:ext uri="{FF2B5EF4-FFF2-40B4-BE49-F238E27FC236}">
+                <a16:creationId xmlns:a16="http://schemas.microsoft.com/office/drawing/2014/main" id="{6C680BFA-7520-108B-87D5-B76B0E1D057E}"/>
+              </a:ext>
+            </a:extLst>
+          </p:cNvPr>
+          <p:cNvSpPr txBox="1"/>
+          <p:nvPr/>
+        </p:nvSpPr>
+        <p:spPr>
+          <a:xfrm>
+            <a:off x="2698376" y="2590800"/>
+            <a:ext cx="789711" cy="369332"/>
+          </a:xfrm>
+          <a:prstGeom prst="rect">
+            <a:avLst/>
+          </a:prstGeom>
+          <a:noFill/>
+        </p:spPr>
+        <p:txBody>
+          <a:bodyPr wrap="square" rtlCol="0">
+            <a:spAutoFit/>
+          </a:bodyPr>
+          <a:lstStyle/>
+          <a:p>
+            <a:r>
+              <a:rPr lang="en-US" dirty="0"/>
+              <a:t>syn</a:t>
+            </a:r>
+          </a:p>
+        </p:txBody>
+      </p:sp>
       <p:pic>
         <p:nvPicPr>
-          <p:cNvPr id="5" name="Picture 4">
-            <a:extLst>
-              <a:ext uri="{FF2B5EF4-FFF2-40B4-BE49-F238E27FC236}">
-                <a16:creationId xmlns:a16="http://schemas.microsoft.com/office/drawing/2014/main" id="{DBD8EC77-157A-046F-94EE-EC4FDA0667F5}"/>
+          <p:cNvPr id="10" name="Picture 9">
+            <a:extLst>
+              <a:ext uri="{FF2B5EF4-FFF2-40B4-BE49-F238E27FC236}">
+                <a16:creationId xmlns:a16="http://schemas.microsoft.com/office/drawing/2014/main" id="{9FE0576C-CC03-8F06-D0B9-83A0D41700A5}"/>
               </a:ext>
             </a:extLst>
           </p:cNvPr>
@@ -5108,103 +5295,8 @@
         </p:blipFill>
         <p:spPr>
           <a:xfrm>
-            <a:off x="6096000" y="584563"/>
-            <a:ext cx="5897653" cy="4674867"/>
-          </a:xfrm>
-          <a:prstGeom prst="rect">
-            <a:avLst/>
-          </a:prstGeom>
-        </p:spPr>
-      </p:pic>
-      <p:sp>
-        <p:nvSpPr>
-          <p:cNvPr id="2" name="TextBox 1">
-            <a:extLst>
-              <a:ext uri="{FF2B5EF4-FFF2-40B4-BE49-F238E27FC236}">
-                <a16:creationId xmlns:a16="http://schemas.microsoft.com/office/drawing/2014/main" id="{D59C35A0-3075-5466-4ABE-BA74AEE59BB1}"/>
-              </a:ext>
-            </a:extLst>
-          </p:cNvPr>
-          <p:cNvSpPr txBox="1"/>
-          <p:nvPr/>
-        </p:nvSpPr>
-        <p:spPr>
-          <a:xfrm>
-            <a:off x="4545106" y="107655"/>
-            <a:ext cx="4814047" cy="369332"/>
-          </a:xfrm>
-          <a:prstGeom prst="rect">
-            <a:avLst/>
-          </a:prstGeom>
-          <a:noFill/>
-        </p:spPr>
-        <p:txBody>
-          <a:bodyPr wrap="square" rtlCol="0">
-            <a:spAutoFit/>
-          </a:bodyPr>
-          <a:lstStyle/>
-          <a:p>
-            <a:r>
-              <a:rPr lang="en-US" dirty="0"/>
-              <a:t>Frequency of variants per replicate</a:t>
-            </a:r>
-          </a:p>
-        </p:txBody>
-      </p:sp>
-      <p:pic>
-        <p:nvPicPr>
-          <p:cNvPr id="3" name="Picture 2">
-            <a:extLst>
-              <a:ext uri="{FF2B5EF4-FFF2-40B4-BE49-F238E27FC236}">
-                <a16:creationId xmlns:a16="http://schemas.microsoft.com/office/drawing/2014/main" id="{1B07CD41-CDE4-8543-24F4-2DC766C1EC0F}"/>
-              </a:ext>
-            </a:extLst>
-          </p:cNvPr>
-          <p:cNvPicPr>
-            <a:picLocks noChangeAspect="1"/>
-          </p:cNvPicPr>
-          <p:nvPr/>
-        </p:nvPicPr>
-        <p:blipFill>
-          <a:blip r:embed="rId5"/>
-          <a:stretch>
-            <a:fillRect/>
-          </a:stretch>
-        </p:blipFill>
-        <p:spPr>
-          <a:xfrm>
-            <a:off x="1700306" y="5599580"/>
-            <a:ext cx="2844800" cy="876300"/>
-          </a:xfrm>
-          <a:prstGeom prst="rect">
-            <a:avLst/>
-          </a:prstGeom>
-        </p:spPr>
-      </p:pic>
-      <p:pic>
-        <p:nvPicPr>
-          <p:cNvPr id="6" name="Picture 5">
-            <a:extLst>
-              <a:ext uri="{FF2B5EF4-FFF2-40B4-BE49-F238E27FC236}">
-                <a16:creationId xmlns:a16="http://schemas.microsoft.com/office/drawing/2014/main" id="{69EC9CDD-E497-A545-5FF4-98C15836A7A0}"/>
-              </a:ext>
-            </a:extLst>
-          </p:cNvPr>
-          <p:cNvPicPr>
-            <a:picLocks noChangeAspect="1"/>
-          </p:cNvPicPr>
-          <p:nvPr/>
-        </p:nvPicPr>
-        <p:blipFill>
-          <a:blip r:embed="rId6"/>
-          <a:stretch>
-            <a:fillRect/>
-          </a:stretch>
-        </p:blipFill>
-        <p:spPr>
-          <a:xfrm>
-            <a:off x="7735794" y="5599580"/>
-            <a:ext cx="2755900" cy="901700"/>
+            <a:off x="1721431" y="3196421"/>
+            <a:ext cx="3556000" cy="2654300"/>
           </a:xfrm>
           <a:prstGeom prst="rect">
             <a:avLst/>
@@ -5214,7 +5306,7 @@
     </p:spTree>
     <p:extLst>
       <p:ext uri="{BB962C8B-B14F-4D97-AF65-F5344CB8AC3E}">
-        <p14:creationId xmlns:p14="http://schemas.microsoft.com/office/powerpoint/2010/main" val="985864802"/>
+        <p14:creationId xmlns:p14="http://schemas.microsoft.com/office/powerpoint/2010/main" val="3292517074"/>
       </p:ext>
     </p:extLst>
   </p:cSld>
@@ -5246,7 +5338,7 @@
           <p:cNvPr id="4" name="Picture 3">
             <a:extLst>
               <a:ext uri="{FF2B5EF4-FFF2-40B4-BE49-F238E27FC236}">
-                <a16:creationId xmlns:a16="http://schemas.microsoft.com/office/drawing/2014/main" id="{4848E52F-460F-0D36-B0F4-E6E4CC966506}"/>
+                <a16:creationId xmlns:a16="http://schemas.microsoft.com/office/drawing/2014/main" id="{D110D539-20FB-E86E-B3C6-F408686586EE}"/>
               </a:ext>
             </a:extLst>
           </p:cNvPr>
@@ -5256,15 +5348,140 @@
           <p:nvPr/>
         </p:nvPicPr>
         <p:blipFill>
-          <a:blip r:embed="rId2"/>
+          <a:blip r:embed="rId3"/>
           <a:stretch>
             <a:fillRect/>
           </a:stretch>
         </p:blipFill>
         <p:spPr>
           <a:xfrm>
-            <a:off x="2209800" y="582068"/>
-            <a:ext cx="7772400" cy="5693863"/>
+            <a:off x="0" y="584563"/>
+            <a:ext cx="5747904" cy="4598323"/>
+          </a:xfrm>
+          <a:prstGeom prst="rect">
+            <a:avLst/>
+          </a:prstGeom>
+        </p:spPr>
+      </p:pic>
+      <p:pic>
+        <p:nvPicPr>
+          <p:cNvPr id="5" name="Picture 4">
+            <a:extLst>
+              <a:ext uri="{FF2B5EF4-FFF2-40B4-BE49-F238E27FC236}">
+                <a16:creationId xmlns:a16="http://schemas.microsoft.com/office/drawing/2014/main" id="{DBD8EC77-157A-046F-94EE-EC4FDA0667F5}"/>
+              </a:ext>
+            </a:extLst>
+          </p:cNvPr>
+          <p:cNvPicPr>
+            <a:picLocks noChangeAspect="1"/>
+          </p:cNvPicPr>
+          <p:nvPr/>
+        </p:nvPicPr>
+        <p:blipFill>
+          <a:blip r:embed="rId4"/>
+          <a:stretch>
+            <a:fillRect/>
+          </a:stretch>
+        </p:blipFill>
+        <p:spPr>
+          <a:xfrm>
+            <a:off x="6096000" y="584563"/>
+            <a:ext cx="5897653" cy="4674867"/>
+          </a:xfrm>
+          <a:prstGeom prst="rect">
+            <a:avLst/>
+          </a:prstGeom>
+        </p:spPr>
+      </p:pic>
+      <p:sp>
+        <p:nvSpPr>
+          <p:cNvPr id="2" name="TextBox 1">
+            <a:extLst>
+              <a:ext uri="{FF2B5EF4-FFF2-40B4-BE49-F238E27FC236}">
+                <a16:creationId xmlns:a16="http://schemas.microsoft.com/office/drawing/2014/main" id="{D59C35A0-3075-5466-4ABE-BA74AEE59BB1}"/>
+              </a:ext>
+            </a:extLst>
+          </p:cNvPr>
+          <p:cNvSpPr txBox="1"/>
+          <p:nvPr/>
+        </p:nvSpPr>
+        <p:spPr>
+          <a:xfrm>
+            <a:off x="4545106" y="107655"/>
+            <a:ext cx="4814047" cy="369332"/>
+          </a:xfrm>
+          <a:prstGeom prst="rect">
+            <a:avLst/>
+          </a:prstGeom>
+          <a:noFill/>
+        </p:spPr>
+        <p:txBody>
+          <a:bodyPr wrap="square" rtlCol="0">
+            <a:spAutoFit/>
+          </a:bodyPr>
+          <a:lstStyle/>
+          <a:p>
+            <a:r>
+              <a:rPr lang="en-US" dirty="0"/>
+              <a:t>Frequency of variants per replicate</a:t>
+            </a:r>
+          </a:p>
+        </p:txBody>
+      </p:sp>
+      <p:pic>
+        <p:nvPicPr>
+          <p:cNvPr id="3" name="Picture 2">
+            <a:extLst>
+              <a:ext uri="{FF2B5EF4-FFF2-40B4-BE49-F238E27FC236}">
+                <a16:creationId xmlns:a16="http://schemas.microsoft.com/office/drawing/2014/main" id="{1B07CD41-CDE4-8543-24F4-2DC766C1EC0F}"/>
+              </a:ext>
+            </a:extLst>
+          </p:cNvPr>
+          <p:cNvPicPr>
+            <a:picLocks noChangeAspect="1"/>
+          </p:cNvPicPr>
+          <p:nvPr/>
+        </p:nvPicPr>
+        <p:blipFill>
+          <a:blip r:embed="rId5"/>
+          <a:stretch>
+            <a:fillRect/>
+          </a:stretch>
+        </p:blipFill>
+        <p:spPr>
+          <a:xfrm>
+            <a:off x="1700306" y="5599580"/>
+            <a:ext cx="2844800" cy="876300"/>
+          </a:xfrm>
+          <a:prstGeom prst="rect">
+            <a:avLst/>
+          </a:prstGeom>
+        </p:spPr>
+      </p:pic>
+      <p:pic>
+        <p:nvPicPr>
+          <p:cNvPr id="6" name="Picture 5">
+            <a:extLst>
+              <a:ext uri="{FF2B5EF4-FFF2-40B4-BE49-F238E27FC236}">
+                <a16:creationId xmlns:a16="http://schemas.microsoft.com/office/drawing/2014/main" id="{69EC9CDD-E497-A545-5FF4-98C15836A7A0}"/>
+              </a:ext>
+            </a:extLst>
+          </p:cNvPr>
+          <p:cNvPicPr>
+            <a:picLocks noChangeAspect="1"/>
+          </p:cNvPicPr>
+          <p:nvPr/>
+        </p:nvPicPr>
+        <p:blipFill>
+          <a:blip r:embed="rId6"/>
+          <a:stretch>
+            <a:fillRect/>
+          </a:stretch>
+        </p:blipFill>
+        <p:spPr>
+          <a:xfrm>
+            <a:off x="7735794" y="5599580"/>
+            <a:ext cx="2755900" cy="901700"/>
           </a:xfrm>
           <a:prstGeom prst="rect">
             <a:avLst/>
@@ -5274,7 +5491,7 @@
     </p:spTree>
     <p:extLst>
       <p:ext uri="{BB962C8B-B14F-4D97-AF65-F5344CB8AC3E}">
-        <p14:creationId xmlns:p14="http://schemas.microsoft.com/office/powerpoint/2010/main" val="4075968379"/>
+        <p14:creationId xmlns:p14="http://schemas.microsoft.com/office/powerpoint/2010/main" val="985864802"/>
       </p:ext>
     </p:extLst>
   </p:cSld>
@@ -5306,7 +5523,7 @@
           <p:cNvPr id="4" name="Picture 3">
             <a:extLst>
               <a:ext uri="{FF2B5EF4-FFF2-40B4-BE49-F238E27FC236}">
-                <a16:creationId xmlns:a16="http://schemas.microsoft.com/office/drawing/2014/main" id="{C6580359-5211-EC70-F551-5116C68B63F8}"/>
+                <a16:creationId xmlns:a16="http://schemas.microsoft.com/office/drawing/2014/main" id="{4848E52F-460F-0D36-B0F4-E6E4CC966506}"/>
               </a:ext>
             </a:extLst>
           </p:cNvPr>
@@ -5323,96 +5540,18 @@
         </p:blipFill>
         <p:spPr>
           <a:xfrm>
-            <a:off x="1792941" y="1500277"/>
-            <a:ext cx="9144000" cy="4013125"/>
+            <a:off x="2209800" y="582068"/>
+            <a:ext cx="7772400" cy="5693863"/>
           </a:xfrm>
           <a:prstGeom prst="rect">
             <a:avLst/>
           </a:prstGeom>
         </p:spPr>
       </p:pic>
-      <p:sp>
-        <p:nvSpPr>
-          <p:cNvPr id="5" name="TextBox 4">
-            <a:extLst>
-              <a:ext uri="{FF2B5EF4-FFF2-40B4-BE49-F238E27FC236}">
-                <a16:creationId xmlns:a16="http://schemas.microsoft.com/office/drawing/2014/main" id="{24C71A6C-F601-A3F9-31FA-806176505BED}"/>
-              </a:ext>
-            </a:extLst>
-          </p:cNvPr>
-          <p:cNvSpPr txBox="1"/>
-          <p:nvPr/>
-        </p:nvSpPr>
-        <p:spPr>
-          <a:xfrm>
-            <a:off x="4926106" y="1813152"/>
-            <a:ext cx="2877670" cy="369332"/>
-          </a:xfrm>
-          <a:prstGeom prst="rect">
-            <a:avLst/>
-          </a:prstGeom>
-          <a:noFill/>
-        </p:spPr>
-        <p:txBody>
-          <a:bodyPr wrap="square" rtlCol="0">
-            <a:spAutoFit/>
-          </a:bodyPr>
-          <a:lstStyle/>
-          <a:p>
-            <a:r>
-              <a:rPr lang="en-US" dirty="0"/>
-              <a:t>in stock viruses</a:t>
-            </a:r>
-          </a:p>
-        </p:txBody>
-      </p:sp>
-      <p:sp>
-        <p:nvSpPr>
-          <p:cNvPr id="6" name="TextBox 5">
-            <a:extLst>
-              <a:ext uri="{FF2B5EF4-FFF2-40B4-BE49-F238E27FC236}">
-                <a16:creationId xmlns:a16="http://schemas.microsoft.com/office/drawing/2014/main" id="{739178A3-A72E-6F6E-D118-AB592B2E2290}"/>
-              </a:ext>
-            </a:extLst>
-          </p:cNvPr>
-          <p:cNvSpPr txBox="1"/>
-          <p:nvPr/>
-        </p:nvSpPr>
-        <p:spPr>
-          <a:xfrm>
-            <a:off x="4074459" y="5513402"/>
-            <a:ext cx="4249270" cy="923330"/>
-          </a:xfrm>
-          <a:prstGeom prst="rect">
-            <a:avLst/>
-          </a:prstGeom>
-          <a:noFill/>
-        </p:spPr>
-        <p:txBody>
-          <a:bodyPr wrap="square" rtlCol="0">
-            <a:spAutoFit/>
-          </a:bodyPr>
-          <a:lstStyle/>
-          <a:p>
-            <a:r>
-              <a:rPr lang="en-US" dirty="0"/>
-              <a:t>As the </a:t>
-            </a:r>
-            <a:r>
-              <a:rPr lang="en-US" dirty="0" err="1"/>
-              <a:t>ct</a:t>
-            </a:r>
-            <a:r>
-              <a:rPr lang="en-US" dirty="0"/>
-              <a:t>-value goes up (less virus), the the amount of single variants also goes up! Which is what you want to see</a:t>
-            </a:r>
-          </a:p>
-        </p:txBody>
-      </p:sp>
     </p:spTree>
     <p:extLst>
       <p:ext uri="{BB962C8B-B14F-4D97-AF65-F5344CB8AC3E}">
-        <p14:creationId xmlns:p14="http://schemas.microsoft.com/office/powerpoint/2010/main" val="758918281"/>
+        <p14:creationId xmlns:p14="http://schemas.microsoft.com/office/powerpoint/2010/main" val="4075968379"/>
       </p:ext>
     </p:extLst>
   </p:cSld>
@@ -5439,47 +5578,12 @@
           <a:chExt cx="0" cy="0"/>
         </a:xfrm>
       </p:grpSpPr>
-      <p:sp>
-        <p:nvSpPr>
-          <p:cNvPr id="5" name="TextBox 4">
-            <a:extLst>
-              <a:ext uri="{FF2B5EF4-FFF2-40B4-BE49-F238E27FC236}">
-                <a16:creationId xmlns:a16="http://schemas.microsoft.com/office/drawing/2014/main" id="{BFE05C8A-ACDE-B4F9-B859-E350447D6B9C}"/>
-              </a:ext>
-            </a:extLst>
-          </p:cNvPr>
-          <p:cNvSpPr txBox="1"/>
-          <p:nvPr/>
-        </p:nvSpPr>
-        <p:spPr>
-          <a:xfrm>
-            <a:off x="6391835" y="269933"/>
-            <a:ext cx="2877670" cy="369332"/>
-          </a:xfrm>
-          <a:prstGeom prst="rect">
-            <a:avLst/>
-          </a:prstGeom>
-          <a:noFill/>
-        </p:spPr>
-        <p:txBody>
-          <a:bodyPr wrap="square" rtlCol="0">
-            <a:spAutoFit/>
-          </a:bodyPr>
-          <a:lstStyle/>
-          <a:p>
-            <a:r>
-              <a:rPr lang="en-US" dirty="0"/>
-              <a:t>in stock viruses</a:t>
-            </a:r>
-          </a:p>
-        </p:txBody>
-      </p:sp>
       <p:pic>
         <p:nvPicPr>
-          <p:cNvPr id="6" name="Picture 5">
-            <a:extLst>
-              <a:ext uri="{FF2B5EF4-FFF2-40B4-BE49-F238E27FC236}">
-                <a16:creationId xmlns:a16="http://schemas.microsoft.com/office/drawing/2014/main" id="{40958DC1-A7A5-30C0-FB27-3F962EC1DF0A}"/>
+          <p:cNvPr id="4" name="Picture 3">
+            <a:extLst>
+              <a:ext uri="{FF2B5EF4-FFF2-40B4-BE49-F238E27FC236}">
+                <a16:creationId xmlns:a16="http://schemas.microsoft.com/office/drawing/2014/main" id="{C6580359-5211-EC70-F551-5116C68B63F8}"/>
               </a:ext>
             </a:extLst>
           </p:cNvPr>
@@ -5496,8 +5600,8 @@
         </p:blipFill>
         <p:spPr>
           <a:xfrm>
-            <a:off x="2989730" y="646450"/>
-            <a:ext cx="7772400" cy="5941617"/>
+            <a:off x="1792941" y="1500277"/>
+            <a:ext cx="9144000" cy="4013125"/>
           </a:xfrm>
           <a:prstGeom prst="rect">
             <a:avLst/>
@@ -5506,10 +5610,10 @@
       </p:pic>
       <p:sp>
         <p:nvSpPr>
-          <p:cNvPr id="7" name="TextBox 6">
-            <a:extLst>
-              <a:ext uri="{FF2B5EF4-FFF2-40B4-BE49-F238E27FC236}">
-                <a16:creationId xmlns:a16="http://schemas.microsoft.com/office/drawing/2014/main" id="{D935E72B-5A27-4DCC-2676-E8B8CC35BB2C}"/>
+          <p:cNvPr id="5" name="TextBox 4">
+            <a:extLst>
+              <a:ext uri="{FF2B5EF4-FFF2-40B4-BE49-F238E27FC236}">
+                <a16:creationId xmlns:a16="http://schemas.microsoft.com/office/drawing/2014/main" id="{24C71A6C-F601-A3F9-31FA-806176505BED}"/>
               </a:ext>
             </a:extLst>
           </p:cNvPr>
@@ -5518,8 +5622,8 @@
         </p:nvSpPr>
         <p:spPr>
           <a:xfrm>
-            <a:off x="524435" y="2878594"/>
-            <a:ext cx="2299447" cy="1477328"/>
+            <a:off x="4926106" y="1813152"/>
+            <a:ext cx="2877670" cy="369332"/>
           </a:xfrm>
           <a:prstGeom prst="rect">
             <a:avLst/>
@@ -5534,7 +5638,42 @@
           <a:p>
             <a:r>
               <a:rPr lang="en-US" dirty="0"/>
-              <a:t>As </a:t>
+              <a:t>in stock viruses</a:t>
+            </a:r>
+          </a:p>
+        </p:txBody>
+      </p:sp>
+      <p:sp>
+        <p:nvSpPr>
+          <p:cNvPr id="6" name="TextBox 5">
+            <a:extLst>
+              <a:ext uri="{FF2B5EF4-FFF2-40B4-BE49-F238E27FC236}">
+                <a16:creationId xmlns:a16="http://schemas.microsoft.com/office/drawing/2014/main" id="{739178A3-A72E-6F6E-D118-AB592B2E2290}"/>
+              </a:ext>
+            </a:extLst>
+          </p:cNvPr>
+          <p:cNvSpPr txBox="1"/>
+          <p:nvPr/>
+        </p:nvSpPr>
+        <p:spPr>
+          <a:xfrm>
+            <a:off x="4074459" y="5513402"/>
+            <a:ext cx="4249270" cy="923330"/>
+          </a:xfrm>
+          <a:prstGeom prst="rect">
+            <a:avLst/>
+          </a:prstGeom>
+          <a:noFill/>
+        </p:spPr>
+        <p:txBody>
+          <a:bodyPr wrap="square" rtlCol="0">
+            <a:spAutoFit/>
+          </a:bodyPr>
+          <a:lstStyle/>
+          <a:p>
+            <a:r>
+              <a:rPr lang="en-US" dirty="0"/>
+              <a:t>As the </a:t>
             </a:r>
             <a:r>
               <a:rPr lang="en-US" dirty="0" err="1"/>
@@ -5542,15 +5681,7 @@
             </a:r>
             <a:r>
               <a:rPr lang="en-US" dirty="0"/>
-              <a:t> values go up, number of single variants goes up (except for last </a:t>
-            </a:r>
-            <a:r>
-              <a:rPr lang="en-US" dirty="0" err="1"/>
-              <a:t>ct</a:t>
-            </a:r>
-            <a:r>
-              <a:rPr lang="en-US" dirty="0"/>
-              <a:t> value)</a:t>
+              <a:t>-value goes up (less virus), the the amount of single variants also goes up! Which is what you want to see</a:t>
             </a:r>
           </a:p>
         </p:txBody>
@@ -5558,7 +5689,7 @@
     </p:spTree>
     <p:extLst>
       <p:ext uri="{BB962C8B-B14F-4D97-AF65-F5344CB8AC3E}">
-        <p14:creationId xmlns:p14="http://schemas.microsoft.com/office/powerpoint/2010/main" val="1363901422"/>
+        <p14:creationId xmlns:p14="http://schemas.microsoft.com/office/powerpoint/2010/main" val="758918281"/>
       </p:ext>
     </p:extLst>
   </p:cSld>

</xml_diff>

<commit_message>
reran pipeline to include previously omitted samples
</commit_message>
<xml_diff>
--- a/results/within-host-stock-synthetic-controls.pptx
+++ b/results/within-host-stock-synthetic-controls.pptx
@@ -5,7 +5,7 @@
     <p:sldMasterId id="2147483674" r:id="rId1"/>
   </p:sldMasterIdLst>
   <p:notesMasterIdLst>
-    <p:notesMasterId r:id="rId16"/>
+    <p:notesMasterId r:id="rId15"/>
   </p:notesMasterIdLst>
   <p:sldIdLst>
     <p:sldId id="256" r:id="rId2"/>
@@ -16,12 +16,11 @@
     <p:sldId id="997" r:id="rId7"/>
     <p:sldId id="998" r:id="rId8"/>
     <p:sldId id="999" r:id="rId9"/>
-    <p:sldId id="1019" r:id="rId10"/>
-    <p:sldId id="1001" r:id="rId11"/>
-    <p:sldId id="1002" r:id="rId12"/>
-    <p:sldId id="1003" r:id="rId13"/>
-    <p:sldId id="1004" r:id="rId14"/>
-    <p:sldId id="1005" r:id="rId15"/>
+    <p:sldId id="1001" r:id="rId10"/>
+    <p:sldId id="1002" r:id="rId11"/>
+    <p:sldId id="1003" r:id="rId12"/>
+    <p:sldId id="1004" r:id="rId13"/>
+    <p:sldId id="1005" r:id="rId14"/>
   </p:sldIdLst>
   <p:sldSz cx="12192000" cy="6858000"/>
   <p:notesSz cx="6858000" cy="9144000"/>
@@ -210,7 +209,7 @@
           <a:p>
             <a:fld id="{D6EAD439-CC95-944F-A084-354E9442AA61}" type="datetimeFigureOut">
               <a:rPr lang="en-US" smtClean="0"/>
-              <a:t>8/7/25</a:t>
+              <a:t>8/21/25</a:t>
             </a:fld>
             <a:endParaRPr lang="en-US"/>
           </a:p>
@@ -629,7 +628,7 @@
           <a:p>
             <a:fld id="{310530BC-D414-D145-B0A4-A4A0B5906CC6}" type="slidenum">
               <a:rPr lang="en-US" smtClean="0"/>
-              <a:t>14</a:t>
+              <a:t>13</a:t>
             </a:fld>
             <a:endParaRPr lang="en-US"/>
           </a:p>
@@ -795,7 +794,7 @@
           <a:p>
             <a:fld id="{6444479B-705B-4489-957E-7E8A228BDFA0}" type="datetime1">
               <a:rPr lang="en-US" smtClean="0"/>
-              <a:t>8/7/25</a:t>
+              <a:t>8/21/25</a:t>
             </a:fld>
             <a:endParaRPr lang="en-US"/>
           </a:p>
@@ -993,7 +992,7 @@
           <a:p>
             <a:fld id="{C07B66AD-7C08-490A-ADA4-B47E10FB2407}" type="datetime1">
               <a:rPr lang="en-US" smtClean="0"/>
-              <a:t>8/7/25</a:t>
+              <a:t>8/21/25</a:t>
             </a:fld>
             <a:endParaRPr lang="en-US"/>
           </a:p>
@@ -1201,7 +1200,7 @@
           <a:p>
             <a:fld id="{05B95027-4255-49E7-9841-CD21BCC99996}" type="datetime1">
               <a:rPr lang="en-US" smtClean="0"/>
-              <a:t>8/7/25</a:t>
+              <a:t>8/21/25</a:t>
             </a:fld>
             <a:endParaRPr lang="en-US"/>
           </a:p>
@@ -1399,7 +1398,7 @@
           <a:p>
             <a:fld id="{9F89F774-3FA6-43B8-9241-99959C8FD463}" type="datetime1">
               <a:rPr lang="en-US" smtClean="0"/>
-              <a:t>8/7/25</a:t>
+              <a:t>8/21/25</a:t>
             </a:fld>
             <a:endParaRPr lang="en-US"/>
           </a:p>
@@ -1674,7 +1673,7 @@
           <a:p>
             <a:fld id="{F9504452-5DCC-4FE2-A5C9-8A5EF6714D65}" type="datetime1">
               <a:rPr lang="en-US" smtClean="0"/>
-              <a:t>8/7/25</a:t>
+              <a:t>8/21/25</a:t>
             </a:fld>
             <a:endParaRPr lang="en-US"/>
           </a:p>
@@ -1939,7 +1938,7 @@
           <a:p>
             <a:fld id="{E579ABC2-0180-4F3A-A895-A85BC724D472}" type="datetime1">
               <a:rPr lang="en-US" smtClean="0"/>
-              <a:t>8/7/25</a:t>
+              <a:t>8/21/25</a:t>
             </a:fld>
             <a:endParaRPr lang="en-US"/>
           </a:p>
@@ -2351,7 +2350,7 @@
           <a:p>
             <a:fld id="{6AEEA9BA-4E8F-439E-BEA4-91FBA01E3F5F}" type="datetime1">
               <a:rPr lang="en-US" smtClean="0"/>
-              <a:t>8/7/25</a:t>
+              <a:t>8/21/25</a:t>
             </a:fld>
             <a:endParaRPr lang="en-US"/>
           </a:p>
@@ -2492,7 +2491,7 @@
           <a:p>
             <a:fld id="{BE15BF18-0007-481C-AA29-413124BC3EE7}" type="datetime1">
               <a:rPr lang="en-US" smtClean="0"/>
-              <a:t>8/7/25</a:t>
+              <a:t>8/21/25</a:t>
             </a:fld>
             <a:endParaRPr lang="en-US"/>
           </a:p>
@@ -2605,7 +2604,7 @@
           <a:p>
             <a:fld id="{09BE9870-3748-43AD-B547-02A075CB4A1D}" type="datetime1">
               <a:rPr lang="en-US" smtClean="0"/>
-              <a:t>8/7/25</a:t>
+              <a:t>8/21/25</a:t>
             </a:fld>
             <a:endParaRPr lang="en-US"/>
           </a:p>
@@ -2916,7 +2915,7 @@
           <a:p>
             <a:fld id="{558E7897-33C5-4F1A-9307-D068E37F3DC7}" type="datetime1">
               <a:rPr lang="en-US" smtClean="0"/>
-              <a:t>8/7/25</a:t>
+              <a:t>8/21/25</a:t>
             </a:fld>
             <a:endParaRPr lang="en-US"/>
           </a:p>
@@ -3204,7 +3203,7 @@
           <a:p>
             <a:fld id="{82E171BA-CC09-47C8-A6DF-F5C5CB59CEEC}" type="datetime1">
               <a:rPr lang="en-US" smtClean="0"/>
-              <a:t>8/7/25</a:t>
+              <a:t>8/21/25</a:t>
             </a:fld>
             <a:endParaRPr lang="en-US"/>
           </a:p>
@@ -3445,7 +3444,7 @@
           <a:p>
             <a:fld id="{7DA38F49-B3E2-4BF0-BEC7-C30D34ABBB8D}" type="datetime1">
               <a:rPr lang="en-US" smtClean="0"/>
-              <a:t>8/7/25</a:t>
+              <a:t>8/21/25</a:t>
             </a:fld>
             <a:endParaRPr lang="en-US"/>
           </a:p>
@@ -4060,13 +4059,18 @@
           </a:p>
           <a:p>
             <a:r>
-              <a:rPr lang="en-US" dirty="0">
+              <a:rPr lang="en-US">
                 <a:solidFill>
                   <a:srgbClr val="FFFFFF"/>
                 </a:solidFill>
               </a:rPr>
-              <a:t>07/22/2025</a:t>
-            </a:r>
+              <a:t>08/21/2025</a:t>
+            </a:r>
+            <a:endParaRPr lang="en-US" dirty="0">
+              <a:solidFill>
+                <a:srgbClr val="FFFFFF"/>
+              </a:solidFill>
+            </a:endParaRPr>
           </a:p>
         </p:txBody>
       </p:sp>
@@ -4100,12 +4104,98 @@
           <a:chExt cx="0" cy="0"/>
         </a:xfrm>
       </p:grpSpPr>
+      <p:sp>
+        <p:nvSpPr>
+          <p:cNvPr id="5" name="TextBox 4">
+            <a:extLst>
+              <a:ext uri="{FF2B5EF4-FFF2-40B4-BE49-F238E27FC236}">
+                <a16:creationId xmlns:a16="http://schemas.microsoft.com/office/drawing/2014/main" id="{BFE05C8A-ACDE-B4F9-B859-E350447D6B9C}"/>
+              </a:ext>
+            </a:extLst>
+          </p:cNvPr>
+          <p:cNvSpPr txBox="1"/>
+          <p:nvPr/>
+        </p:nvSpPr>
+        <p:spPr>
+          <a:xfrm>
+            <a:off x="6391835" y="269933"/>
+            <a:ext cx="2877670" cy="369332"/>
+          </a:xfrm>
+          <a:prstGeom prst="rect">
+            <a:avLst/>
+          </a:prstGeom>
+          <a:noFill/>
+        </p:spPr>
+        <p:txBody>
+          <a:bodyPr wrap="square" rtlCol="0">
+            <a:spAutoFit/>
+          </a:bodyPr>
+          <a:lstStyle/>
+          <a:p>
+            <a:r>
+              <a:rPr lang="en-US" dirty="0"/>
+              <a:t>in stock viruses</a:t>
+            </a:r>
+          </a:p>
+        </p:txBody>
+      </p:sp>
+      <p:sp>
+        <p:nvSpPr>
+          <p:cNvPr id="7" name="TextBox 6">
+            <a:extLst>
+              <a:ext uri="{FF2B5EF4-FFF2-40B4-BE49-F238E27FC236}">
+                <a16:creationId xmlns:a16="http://schemas.microsoft.com/office/drawing/2014/main" id="{D935E72B-5A27-4DCC-2676-E8B8CC35BB2C}"/>
+              </a:ext>
+            </a:extLst>
+          </p:cNvPr>
+          <p:cNvSpPr txBox="1"/>
+          <p:nvPr/>
+        </p:nvSpPr>
+        <p:spPr>
+          <a:xfrm>
+            <a:off x="524435" y="2878594"/>
+            <a:ext cx="2299447" cy="1477328"/>
+          </a:xfrm>
+          <a:prstGeom prst="rect">
+            <a:avLst/>
+          </a:prstGeom>
+          <a:noFill/>
+        </p:spPr>
+        <p:txBody>
+          <a:bodyPr wrap="square" rtlCol="0">
+            <a:spAutoFit/>
+          </a:bodyPr>
+          <a:lstStyle/>
+          <a:p>
+            <a:r>
+              <a:rPr lang="en-US" dirty="0"/>
+              <a:t>As </a:t>
+            </a:r>
+            <a:r>
+              <a:rPr lang="en-US" dirty="0" err="1"/>
+              <a:t>ct</a:t>
+            </a:r>
+            <a:r>
+              <a:rPr lang="en-US" dirty="0"/>
+              <a:t> values go up, number of single variants goes up (except for last </a:t>
+            </a:r>
+            <a:r>
+              <a:rPr lang="en-US" dirty="0" err="1"/>
+              <a:t>ct</a:t>
+            </a:r>
+            <a:r>
+              <a:rPr lang="en-US" dirty="0"/>
+              <a:t> value)</a:t>
+            </a:r>
+          </a:p>
+        </p:txBody>
+      </p:sp>
       <p:pic>
         <p:nvPicPr>
-          <p:cNvPr id="4" name="Picture 3">
-            <a:extLst>
-              <a:ext uri="{FF2B5EF4-FFF2-40B4-BE49-F238E27FC236}">
-                <a16:creationId xmlns:a16="http://schemas.microsoft.com/office/drawing/2014/main" id="{C6580359-5211-EC70-F551-5116C68B63F8}"/>
+          <p:cNvPr id="2" name="Picture 1">
+            <a:extLst>
+              <a:ext uri="{FF2B5EF4-FFF2-40B4-BE49-F238E27FC236}">
+                <a16:creationId xmlns:a16="http://schemas.microsoft.com/office/drawing/2014/main" id="{3276A5FC-C830-C22A-C89F-E9788F4B8948}"/>
               </a:ext>
             </a:extLst>
           </p:cNvPr>
@@ -4122,96 +4212,18 @@
         </p:blipFill>
         <p:spPr>
           <a:xfrm>
-            <a:off x="1792941" y="1500277"/>
-            <a:ext cx="9144000" cy="4013125"/>
+            <a:off x="3096491" y="776003"/>
+            <a:ext cx="7772400" cy="5682509"/>
           </a:xfrm>
           <a:prstGeom prst="rect">
             <a:avLst/>
           </a:prstGeom>
         </p:spPr>
       </p:pic>
-      <p:sp>
-        <p:nvSpPr>
-          <p:cNvPr id="5" name="TextBox 4">
-            <a:extLst>
-              <a:ext uri="{FF2B5EF4-FFF2-40B4-BE49-F238E27FC236}">
-                <a16:creationId xmlns:a16="http://schemas.microsoft.com/office/drawing/2014/main" id="{24C71A6C-F601-A3F9-31FA-806176505BED}"/>
-              </a:ext>
-            </a:extLst>
-          </p:cNvPr>
-          <p:cNvSpPr txBox="1"/>
-          <p:nvPr/>
-        </p:nvSpPr>
-        <p:spPr>
-          <a:xfrm>
-            <a:off x="4926106" y="1813152"/>
-            <a:ext cx="2877670" cy="369332"/>
-          </a:xfrm>
-          <a:prstGeom prst="rect">
-            <a:avLst/>
-          </a:prstGeom>
-          <a:noFill/>
-        </p:spPr>
-        <p:txBody>
-          <a:bodyPr wrap="square" rtlCol="0">
-            <a:spAutoFit/>
-          </a:bodyPr>
-          <a:lstStyle/>
-          <a:p>
-            <a:r>
-              <a:rPr lang="en-US" dirty="0"/>
-              <a:t>in stock viruses</a:t>
-            </a:r>
-          </a:p>
-        </p:txBody>
-      </p:sp>
-      <p:sp>
-        <p:nvSpPr>
-          <p:cNvPr id="6" name="TextBox 5">
-            <a:extLst>
-              <a:ext uri="{FF2B5EF4-FFF2-40B4-BE49-F238E27FC236}">
-                <a16:creationId xmlns:a16="http://schemas.microsoft.com/office/drawing/2014/main" id="{739178A3-A72E-6F6E-D118-AB592B2E2290}"/>
-              </a:ext>
-            </a:extLst>
-          </p:cNvPr>
-          <p:cNvSpPr txBox="1"/>
-          <p:nvPr/>
-        </p:nvSpPr>
-        <p:spPr>
-          <a:xfrm>
-            <a:off x="4074459" y="5513402"/>
-            <a:ext cx="4249270" cy="923330"/>
-          </a:xfrm>
-          <a:prstGeom prst="rect">
-            <a:avLst/>
-          </a:prstGeom>
-          <a:noFill/>
-        </p:spPr>
-        <p:txBody>
-          <a:bodyPr wrap="square" rtlCol="0">
-            <a:spAutoFit/>
-          </a:bodyPr>
-          <a:lstStyle/>
-          <a:p>
-            <a:r>
-              <a:rPr lang="en-US" dirty="0"/>
-              <a:t>As the </a:t>
-            </a:r>
-            <a:r>
-              <a:rPr lang="en-US" dirty="0" err="1"/>
-              <a:t>ct</a:t>
-            </a:r>
-            <a:r>
-              <a:rPr lang="en-US" dirty="0"/>
-              <a:t>-value goes up (less virus), the the amount of single variants also goes up! Which is what you want to see</a:t>
-            </a:r>
-          </a:p>
-        </p:txBody>
-      </p:sp>
     </p:spTree>
     <p:extLst>
       <p:ext uri="{BB962C8B-B14F-4D97-AF65-F5344CB8AC3E}">
-        <p14:creationId xmlns:p14="http://schemas.microsoft.com/office/powerpoint/2010/main" val="758918281"/>
+        <p14:creationId xmlns:p14="http://schemas.microsoft.com/office/powerpoint/2010/main" val="1363901422"/>
       </p:ext>
     </p:extLst>
   </p:cSld>
@@ -4243,7 +4255,7 @@
           <p:cNvPr id="5" name="TextBox 4">
             <a:extLst>
               <a:ext uri="{FF2B5EF4-FFF2-40B4-BE49-F238E27FC236}">
-                <a16:creationId xmlns:a16="http://schemas.microsoft.com/office/drawing/2014/main" id="{BFE05C8A-ACDE-B4F9-B859-E350447D6B9C}"/>
+                <a16:creationId xmlns:a16="http://schemas.microsoft.com/office/drawing/2014/main" id="{E31B82F4-DD3C-1EC6-0822-3E292A5839B7}"/>
               </a:ext>
             </a:extLst>
           </p:cNvPr>
@@ -4252,8 +4264,8 @@
         </p:nvSpPr>
         <p:spPr>
           <a:xfrm>
-            <a:off x="6391835" y="269933"/>
-            <a:ext cx="2877670" cy="369332"/>
+            <a:off x="838200" y="3012140"/>
+            <a:ext cx="1891553" cy="1200329"/>
           </a:xfrm>
           <a:prstGeom prst="rect">
             <a:avLst/>
@@ -4268,6 +4280,41 @@
           <a:p>
             <a:r>
               <a:rPr lang="en-US" dirty="0"/>
+              <a:t>Same plot as last slide but with shared variants as well</a:t>
+            </a:r>
+          </a:p>
+        </p:txBody>
+      </p:sp>
+      <p:sp>
+        <p:nvSpPr>
+          <p:cNvPr id="6" name="TextBox 5">
+            <a:extLst>
+              <a:ext uri="{FF2B5EF4-FFF2-40B4-BE49-F238E27FC236}">
+                <a16:creationId xmlns:a16="http://schemas.microsoft.com/office/drawing/2014/main" id="{5189A9C4-832E-30D0-8C26-3B6EC26A2113}"/>
+              </a:ext>
+            </a:extLst>
+          </p:cNvPr>
+          <p:cNvSpPr txBox="1"/>
+          <p:nvPr/>
+        </p:nvSpPr>
+        <p:spPr>
+          <a:xfrm>
+            <a:off x="6391835" y="269933"/>
+            <a:ext cx="2877670" cy="369332"/>
+          </a:xfrm>
+          <a:prstGeom prst="rect">
+            <a:avLst/>
+          </a:prstGeom>
+          <a:noFill/>
+        </p:spPr>
+        <p:txBody>
+          <a:bodyPr wrap="square" rtlCol="0">
+            <a:spAutoFit/>
+          </a:bodyPr>
+          <a:lstStyle/>
+          <a:p>
+            <a:r>
+              <a:rPr lang="en-US" dirty="0"/>
               <a:t>in stock viruses</a:t>
             </a:r>
           </a:p>
@@ -4275,10 +4322,10 @@
       </p:sp>
       <p:pic>
         <p:nvPicPr>
-          <p:cNvPr id="6" name="Picture 5">
-            <a:extLst>
-              <a:ext uri="{FF2B5EF4-FFF2-40B4-BE49-F238E27FC236}">
-                <a16:creationId xmlns:a16="http://schemas.microsoft.com/office/drawing/2014/main" id="{40958DC1-A7A5-30C0-FB27-3F962EC1DF0A}"/>
+          <p:cNvPr id="2" name="Picture 1">
+            <a:extLst>
+              <a:ext uri="{FF2B5EF4-FFF2-40B4-BE49-F238E27FC236}">
+                <a16:creationId xmlns:a16="http://schemas.microsoft.com/office/drawing/2014/main" id="{68B930EC-CDE7-1661-D4C4-B9C2A0108B3B}"/>
               </a:ext>
             </a:extLst>
           </p:cNvPr>
@@ -4295,69 +4342,18 @@
         </p:blipFill>
         <p:spPr>
           <a:xfrm>
-            <a:off x="2989730" y="646450"/>
-            <a:ext cx="7772400" cy="5941617"/>
+            <a:off x="3442854" y="1098617"/>
+            <a:ext cx="7772400" cy="5298075"/>
           </a:xfrm>
           <a:prstGeom prst="rect">
             <a:avLst/>
           </a:prstGeom>
         </p:spPr>
       </p:pic>
-      <p:sp>
-        <p:nvSpPr>
-          <p:cNvPr id="7" name="TextBox 6">
-            <a:extLst>
-              <a:ext uri="{FF2B5EF4-FFF2-40B4-BE49-F238E27FC236}">
-                <a16:creationId xmlns:a16="http://schemas.microsoft.com/office/drawing/2014/main" id="{D935E72B-5A27-4DCC-2676-E8B8CC35BB2C}"/>
-              </a:ext>
-            </a:extLst>
-          </p:cNvPr>
-          <p:cNvSpPr txBox="1"/>
-          <p:nvPr/>
-        </p:nvSpPr>
-        <p:spPr>
-          <a:xfrm>
-            <a:off x="524435" y="2878594"/>
-            <a:ext cx="2299447" cy="1477328"/>
-          </a:xfrm>
-          <a:prstGeom prst="rect">
-            <a:avLst/>
-          </a:prstGeom>
-          <a:noFill/>
-        </p:spPr>
-        <p:txBody>
-          <a:bodyPr wrap="square" rtlCol="0">
-            <a:spAutoFit/>
-          </a:bodyPr>
-          <a:lstStyle/>
-          <a:p>
-            <a:r>
-              <a:rPr lang="en-US" dirty="0"/>
-              <a:t>As </a:t>
-            </a:r>
-            <a:r>
-              <a:rPr lang="en-US" dirty="0" err="1"/>
-              <a:t>ct</a:t>
-            </a:r>
-            <a:r>
-              <a:rPr lang="en-US" dirty="0"/>
-              <a:t> values go up, number of single variants goes up (except for last </a:t>
-            </a:r>
-            <a:r>
-              <a:rPr lang="en-US" dirty="0" err="1"/>
-              <a:t>ct</a:t>
-            </a:r>
-            <a:r>
-              <a:rPr lang="en-US" dirty="0"/>
-              <a:t> value)</a:t>
-            </a:r>
-          </a:p>
-        </p:txBody>
-      </p:sp>
     </p:spTree>
     <p:extLst>
       <p:ext uri="{BB962C8B-B14F-4D97-AF65-F5344CB8AC3E}">
-        <p14:creationId xmlns:p14="http://schemas.microsoft.com/office/powerpoint/2010/main" val="1363901422"/>
+        <p14:creationId xmlns:p14="http://schemas.microsoft.com/office/powerpoint/2010/main" val="3135660678"/>
       </p:ext>
     </p:extLst>
   </p:cSld>
@@ -4384,12 +4380,156 @@
           <a:chExt cx="0" cy="0"/>
         </a:xfrm>
       </p:grpSpPr>
+      <p:sp>
+        <p:nvSpPr>
+          <p:cNvPr id="5" name="TextBox 4">
+            <a:extLst>
+              <a:ext uri="{FF2B5EF4-FFF2-40B4-BE49-F238E27FC236}">
+                <a16:creationId xmlns:a16="http://schemas.microsoft.com/office/drawing/2014/main" id="{A9737979-BB2C-E004-0AD6-2DB54949B5C6}"/>
+              </a:ext>
+            </a:extLst>
+          </p:cNvPr>
+          <p:cNvSpPr txBox="1"/>
+          <p:nvPr/>
+        </p:nvSpPr>
+        <p:spPr>
+          <a:xfrm>
+            <a:off x="1116106" y="5711886"/>
+            <a:ext cx="4249270" cy="923330"/>
+          </a:xfrm>
+          <a:prstGeom prst="rect">
+            <a:avLst/>
+          </a:prstGeom>
+          <a:noFill/>
+        </p:spPr>
+        <p:txBody>
+          <a:bodyPr wrap="square" rtlCol="0">
+            <a:spAutoFit/>
+          </a:bodyPr>
+          <a:lstStyle/>
+          <a:p>
+            <a:r>
+              <a:rPr lang="en-US" dirty="0"/>
+              <a:t>Looking at variants SHARED between replicates – are they also shared between different dilutions of the stock?</a:t>
+            </a:r>
+          </a:p>
+        </p:txBody>
+      </p:sp>
+      <p:sp>
+        <p:nvSpPr>
+          <p:cNvPr id="6" name="TextBox 5">
+            <a:extLst>
+              <a:ext uri="{FF2B5EF4-FFF2-40B4-BE49-F238E27FC236}">
+                <a16:creationId xmlns:a16="http://schemas.microsoft.com/office/drawing/2014/main" id="{66491804-AF74-9C3C-A039-CF2AF440AB71}"/>
+              </a:ext>
+            </a:extLst>
+          </p:cNvPr>
+          <p:cNvSpPr txBox="1"/>
+          <p:nvPr/>
+        </p:nvSpPr>
+        <p:spPr>
+          <a:xfrm>
+            <a:off x="7086600" y="5711886"/>
+            <a:ext cx="3818965" cy="923330"/>
+          </a:xfrm>
+          <a:prstGeom prst="rect">
+            <a:avLst/>
+          </a:prstGeom>
+          <a:noFill/>
+        </p:spPr>
+        <p:txBody>
+          <a:bodyPr wrap="square" rtlCol="0">
+            <a:spAutoFit/>
+          </a:bodyPr>
+          <a:lstStyle/>
+          <a:p>
+            <a:r>
+              <a:rPr lang="en-US" dirty="0"/>
+              <a:t>If a variant is real, it should be in the other dilutions as well since it is using the same stock virus</a:t>
+            </a:r>
+          </a:p>
+        </p:txBody>
+      </p:sp>
+      <p:cxnSp>
+        <p:nvCxnSpPr>
+          <p:cNvPr id="8" name="Straight Arrow Connector 7">
+            <a:extLst>
+              <a:ext uri="{FF2B5EF4-FFF2-40B4-BE49-F238E27FC236}">
+                <a16:creationId xmlns:a16="http://schemas.microsoft.com/office/drawing/2014/main" id="{80B84FE3-6C58-0989-D2D3-1D6AF3A4A232}"/>
+              </a:ext>
+            </a:extLst>
+          </p:cNvPr>
+          <p:cNvCxnSpPr/>
+          <p:nvPr/>
+        </p:nvCxnSpPr>
+        <p:spPr>
+          <a:xfrm>
+            <a:off x="5647765" y="6173551"/>
+            <a:ext cx="1129553" cy="0"/>
+          </a:xfrm>
+          <a:prstGeom prst="straightConnector1">
+            <a:avLst/>
+          </a:prstGeom>
+          <a:ln w="38100">
+            <a:tailEnd type="triangle"/>
+          </a:ln>
+        </p:spPr>
+        <p:style>
+          <a:lnRef idx="2">
+            <a:schemeClr val="accent1"/>
+          </a:lnRef>
+          <a:fillRef idx="0">
+            <a:schemeClr val="accent1"/>
+          </a:fillRef>
+          <a:effectRef idx="1">
+            <a:schemeClr val="accent1"/>
+          </a:effectRef>
+          <a:fontRef idx="minor">
+            <a:schemeClr val="tx1"/>
+          </a:fontRef>
+        </p:style>
+      </p:cxnSp>
+      <p:sp>
+        <p:nvSpPr>
+          <p:cNvPr id="9" name="TextBox 8">
+            <a:extLst>
+              <a:ext uri="{FF2B5EF4-FFF2-40B4-BE49-F238E27FC236}">
+                <a16:creationId xmlns:a16="http://schemas.microsoft.com/office/drawing/2014/main" id="{0F6474BB-81FF-F36E-0915-0F86E7F0BCD4}"/>
+              </a:ext>
+            </a:extLst>
+          </p:cNvPr>
+          <p:cNvSpPr txBox="1"/>
+          <p:nvPr/>
+        </p:nvSpPr>
+        <p:spPr>
+          <a:xfrm>
+            <a:off x="9982200" y="4451792"/>
+            <a:ext cx="2246473" cy="923330"/>
+          </a:xfrm>
+          <a:prstGeom prst="rect">
+            <a:avLst/>
+          </a:prstGeom>
+          <a:noFill/>
+        </p:spPr>
+        <p:txBody>
+          <a:bodyPr wrap="square" rtlCol="0">
+            <a:spAutoFit/>
+          </a:bodyPr>
+          <a:lstStyle/>
+          <a:p>
+            <a:r>
+              <a:rPr lang="en-US" dirty="0"/>
+              <a:t>*there are only 12 shared variants between reps</a:t>
+            </a:r>
+          </a:p>
+        </p:txBody>
+      </p:sp>
       <p:pic>
         <p:nvPicPr>
-          <p:cNvPr id="4" name="Picture 3">
-            <a:extLst>
-              <a:ext uri="{FF2B5EF4-FFF2-40B4-BE49-F238E27FC236}">
-                <a16:creationId xmlns:a16="http://schemas.microsoft.com/office/drawing/2014/main" id="{5EF37951-5D99-3477-3A29-C7BEB3A0D090}"/>
+          <p:cNvPr id="2" name="Picture 1">
+            <a:extLst>
+              <a:ext uri="{FF2B5EF4-FFF2-40B4-BE49-F238E27FC236}">
+                <a16:creationId xmlns:a16="http://schemas.microsoft.com/office/drawing/2014/main" id="{3AFBB245-FBD3-0CAF-EFB4-81AD023DC2E2}"/>
               </a:ext>
             </a:extLst>
           </p:cNvPr>
@@ -4406,88 +4546,18 @@
         </p:blipFill>
         <p:spPr>
           <a:xfrm>
-            <a:off x="3272118" y="729640"/>
-            <a:ext cx="7772400" cy="5447323"/>
+            <a:off x="2209800" y="428140"/>
+            <a:ext cx="7772400" cy="5283746"/>
           </a:xfrm>
           <a:prstGeom prst="rect">
             <a:avLst/>
           </a:prstGeom>
         </p:spPr>
       </p:pic>
-      <p:sp>
-        <p:nvSpPr>
-          <p:cNvPr id="5" name="TextBox 4">
-            <a:extLst>
-              <a:ext uri="{FF2B5EF4-FFF2-40B4-BE49-F238E27FC236}">
-                <a16:creationId xmlns:a16="http://schemas.microsoft.com/office/drawing/2014/main" id="{E31B82F4-DD3C-1EC6-0822-3E292A5839B7}"/>
-              </a:ext>
-            </a:extLst>
-          </p:cNvPr>
-          <p:cNvSpPr txBox="1"/>
-          <p:nvPr/>
-        </p:nvSpPr>
-        <p:spPr>
-          <a:xfrm>
-            <a:off x="838200" y="3012140"/>
-            <a:ext cx="1891553" cy="1200329"/>
-          </a:xfrm>
-          <a:prstGeom prst="rect">
-            <a:avLst/>
-          </a:prstGeom>
-          <a:noFill/>
-        </p:spPr>
-        <p:txBody>
-          <a:bodyPr wrap="square" rtlCol="0">
-            <a:spAutoFit/>
-          </a:bodyPr>
-          <a:lstStyle/>
-          <a:p>
-            <a:r>
-              <a:rPr lang="en-US" dirty="0"/>
-              <a:t>Same plot as last slide but with shared variants as well</a:t>
-            </a:r>
-          </a:p>
-        </p:txBody>
-      </p:sp>
-      <p:sp>
-        <p:nvSpPr>
-          <p:cNvPr id="6" name="TextBox 5">
-            <a:extLst>
-              <a:ext uri="{FF2B5EF4-FFF2-40B4-BE49-F238E27FC236}">
-                <a16:creationId xmlns:a16="http://schemas.microsoft.com/office/drawing/2014/main" id="{5189A9C4-832E-30D0-8C26-3B6EC26A2113}"/>
-              </a:ext>
-            </a:extLst>
-          </p:cNvPr>
-          <p:cNvSpPr txBox="1"/>
-          <p:nvPr/>
-        </p:nvSpPr>
-        <p:spPr>
-          <a:xfrm>
-            <a:off x="6391835" y="269933"/>
-            <a:ext cx="2877670" cy="369332"/>
-          </a:xfrm>
-          <a:prstGeom prst="rect">
-            <a:avLst/>
-          </a:prstGeom>
-          <a:noFill/>
-        </p:spPr>
-        <p:txBody>
-          <a:bodyPr wrap="square" rtlCol="0">
-            <a:spAutoFit/>
-          </a:bodyPr>
-          <a:lstStyle/>
-          <a:p>
-            <a:r>
-              <a:rPr lang="en-US" dirty="0"/>
-              <a:t>in stock viruses</a:t>
-            </a:r>
-          </a:p>
-        </p:txBody>
-      </p:sp>
     </p:spTree>
     <p:extLst>
       <p:ext uri="{BB962C8B-B14F-4D97-AF65-F5344CB8AC3E}">
-        <p14:creationId xmlns:p14="http://schemas.microsoft.com/office/powerpoint/2010/main" val="3135660678"/>
+        <p14:creationId xmlns:p14="http://schemas.microsoft.com/office/powerpoint/2010/main" val="1188752925"/>
       </p:ext>
     </p:extLst>
   </p:cSld>
@@ -4514,210 +4584,6 @@
           <a:chExt cx="0" cy="0"/>
         </a:xfrm>
       </p:grpSpPr>
-      <p:pic>
-        <p:nvPicPr>
-          <p:cNvPr id="4" name="Picture 3">
-            <a:extLst>
-              <a:ext uri="{FF2B5EF4-FFF2-40B4-BE49-F238E27FC236}">
-                <a16:creationId xmlns:a16="http://schemas.microsoft.com/office/drawing/2014/main" id="{2734FE1D-5AAE-3DE0-FB45-1822F79328B6}"/>
-              </a:ext>
-            </a:extLst>
-          </p:cNvPr>
-          <p:cNvPicPr>
-            <a:picLocks noChangeAspect="1"/>
-          </p:cNvPicPr>
-          <p:nvPr/>
-        </p:nvPicPr>
-        <p:blipFill>
-          <a:blip r:embed="rId2"/>
-          <a:stretch>
-            <a:fillRect/>
-          </a:stretch>
-        </p:blipFill>
-        <p:spPr>
-          <a:xfrm>
-            <a:off x="2209800" y="222784"/>
-            <a:ext cx="7772400" cy="5471137"/>
-          </a:xfrm>
-          <a:prstGeom prst="rect">
-            <a:avLst/>
-          </a:prstGeom>
-        </p:spPr>
-      </p:pic>
-      <p:sp>
-        <p:nvSpPr>
-          <p:cNvPr id="5" name="TextBox 4">
-            <a:extLst>
-              <a:ext uri="{FF2B5EF4-FFF2-40B4-BE49-F238E27FC236}">
-                <a16:creationId xmlns:a16="http://schemas.microsoft.com/office/drawing/2014/main" id="{A9737979-BB2C-E004-0AD6-2DB54949B5C6}"/>
-              </a:ext>
-            </a:extLst>
-          </p:cNvPr>
-          <p:cNvSpPr txBox="1"/>
-          <p:nvPr/>
-        </p:nvSpPr>
-        <p:spPr>
-          <a:xfrm>
-            <a:off x="1116106" y="5711886"/>
-            <a:ext cx="4249270" cy="923330"/>
-          </a:xfrm>
-          <a:prstGeom prst="rect">
-            <a:avLst/>
-          </a:prstGeom>
-          <a:noFill/>
-        </p:spPr>
-        <p:txBody>
-          <a:bodyPr wrap="square" rtlCol="0">
-            <a:spAutoFit/>
-          </a:bodyPr>
-          <a:lstStyle/>
-          <a:p>
-            <a:r>
-              <a:rPr lang="en-US" dirty="0"/>
-              <a:t>Looking at variants SHARED between replicated – are they also shared between different dilutions of the stock?</a:t>
-            </a:r>
-          </a:p>
-        </p:txBody>
-      </p:sp>
-      <p:sp>
-        <p:nvSpPr>
-          <p:cNvPr id="6" name="TextBox 5">
-            <a:extLst>
-              <a:ext uri="{FF2B5EF4-FFF2-40B4-BE49-F238E27FC236}">
-                <a16:creationId xmlns:a16="http://schemas.microsoft.com/office/drawing/2014/main" id="{66491804-AF74-9C3C-A039-CF2AF440AB71}"/>
-              </a:ext>
-            </a:extLst>
-          </p:cNvPr>
-          <p:cNvSpPr txBox="1"/>
-          <p:nvPr/>
-        </p:nvSpPr>
-        <p:spPr>
-          <a:xfrm>
-            <a:off x="7086600" y="5711886"/>
-            <a:ext cx="3818965" cy="923330"/>
-          </a:xfrm>
-          <a:prstGeom prst="rect">
-            <a:avLst/>
-          </a:prstGeom>
-          <a:noFill/>
-        </p:spPr>
-        <p:txBody>
-          <a:bodyPr wrap="square" rtlCol="0">
-            <a:spAutoFit/>
-          </a:bodyPr>
-          <a:lstStyle/>
-          <a:p>
-            <a:r>
-              <a:rPr lang="en-US" dirty="0"/>
-              <a:t>If a variant is real, it should be in the other dilutions as well since it is using the same stock virus</a:t>
-            </a:r>
-          </a:p>
-        </p:txBody>
-      </p:sp>
-      <p:cxnSp>
-        <p:nvCxnSpPr>
-          <p:cNvPr id="8" name="Straight Arrow Connector 7">
-            <a:extLst>
-              <a:ext uri="{FF2B5EF4-FFF2-40B4-BE49-F238E27FC236}">
-                <a16:creationId xmlns:a16="http://schemas.microsoft.com/office/drawing/2014/main" id="{80B84FE3-6C58-0989-D2D3-1D6AF3A4A232}"/>
-              </a:ext>
-            </a:extLst>
-          </p:cNvPr>
-          <p:cNvCxnSpPr/>
-          <p:nvPr/>
-        </p:nvCxnSpPr>
-        <p:spPr>
-          <a:xfrm>
-            <a:off x="5647765" y="6173551"/>
-            <a:ext cx="1129553" cy="0"/>
-          </a:xfrm>
-          <a:prstGeom prst="straightConnector1">
-            <a:avLst/>
-          </a:prstGeom>
-          <a:ln w="38100">
-            <a:tailEnd type="triangle"/>
-          </a:ln>
-        </p:spPr>
-        <p:style>
-          <a:lnRef idx="2">
-            <a:schemeClr val="accent1"/>
-          </a:lnRef>
-          <a:fillRef idx="0">
-            <a:schemeClr val="accent1"/>
-          </a:fillRef>
-          <a:effectRef idx="1">
-            <a:schemeClr val="accent1"/>
-          </a:effectRef>
-          <a:fontRef idx="minor">
-            <a:schemeClr val="tx1"/>
-          </a:fontRef>
-        </p:style>
-      </p:cxnSp>
-      <p:sp>
-        <p:nvSpPr>
-          <p:cNvPr id="9" name="TextBox 8">
-            <a:extLst>
-              <a:ext uri="{FF2B5EF4-FFF2-40B4-BE49-F238E27FC236}">
-                <a16:creationId xmlns:a16="http://schemas.microsoft.com/office/drawing/2014/main" id="{0F6474BB-81FF-F36E-0915-0F86E7F0BCD4}"/>
-              </a:ext>
-            </a:extLst>
-          </p:cNvPr>
-          <p:cNvSpPr txBox="1"/>
-          <p:nvPr/>
-        </p:nvSpPr>
-        <p:spPr>
-          <a:xfrm>
-            <a:off x="10286999" y="4424083"/>
-            <a:ext cx="1685365" cy="923330"/>
-          </a:xfrm>
-          <a:prstGeom prst="rect">
-            <a:avLst/>
-          </a:prstGeom>
-          <a:noFill/>
-        </p:spPr>
-        <p:txBody>
-          <a:bodyPr wrap="square" rtlCol="0">
-            <a:spAutoFit/>
-          </a:bodyPr>
-          <a:lstStyle/>
-          <a:p>
-            <a:r>
-              <a:rPr lang="en-US" dirty="0"/>
-              <a:t>*there are only 11 shared variants</a:t>
-            </a:r>
-          </a:p>
-        </p:txBody>
-      </p:sp>
-    </p:spTree>
-    <p:extLst>
-      <p:ext uri="{BB962C8B-B14F-4D97-AF65-F5344CB8AC3E}">
-        <p14:creationId xmlns:p14="http://schemas.microsoft.com/office/powerpoint/2010/main" val="1188752925"/>
-      </p:ext>
-    </p:extLst>
-  </p:cSld>
-  <p:clrMapOvr>
-    <a:masterClrMapping/>
-  </p:clrMapOvr>
-</p:sld>
-</file>
-
-<file path=ppt/slides/slide14.xml><?xml version="1.0" encoding="utf-8"?>
-<p:sld xmlns:a="http://schemas.openxmlformats.org/drawingml/2006/main" xmlns:r="http://schemas.openxmlformats.org/officeDocument/2006/relationships" xmlns:p="http://schemas.openxmlformats.org/presentationml/2006/main">
-  <p:cSld>
-    <p:spTree>
-      <p:nvGrpSpPr>
-        <p:cNvPr id="1" name=""/>
-        <p:cNvGrpSpPr/>
-        <p:nvPr/>
-      </p:nvGrpSpPr>
-      <p:grpSpPr>
-        <a:xfrm>
-          <a:off x="0" y="0"/>
-          <a:ext cx="0" cy="0"/>
-          <a:chOff x="0" y="0"/>
-          <a:chExt cx="0" cy="0"/>
-        </a:xfrm>
-      </p:grpSpPr>
       <p:sp>
         <p:nvSpPr>
           <p:cNvPr id="2" name="Title 1">
@@ -4780,6 +4646,12 @@
           </a:p>
           <a:p>
             <a:endParaRPr lang="en-US" dirty="0"/>
+          </a:p>
+          <a:p>
+            <a:r>
+              <a:rPr lang="en-US" dirty="0"/>
+              <a:t>Both are Synonymous</a:t>
+            </a:r>
           </a:p>
           <a:p>
             <a:endParaRPr lang="en-US" dirty="0"/>
@@ -4935,12 +4807,62 @@
           <a:chExt cx="0" cy="0"/>
         </a:xfrm>
       </p:grpSpPr>
+      <p:sp>
+        <p:nvSpPr>
+          <p:cNvPr id="2" name="TextBox 1">
+            <a:extLst>
+              <a:ext uri="{FF2B5EF4-FFF2-40B4-BE49-F238E27FC236}">
+                <a16:creationId xmlns:a16="http://schemas.microsoft.com/office/drawing/2014/main" id="{2218F814-1F6F-7C8C-86C3-A96A18989998}"/>
+              </a:ext>
+            </a:extLst>
+          </p:cNvPr>
+          <p:cNvSpPr txBox="1"/>
+          <p:nvPr/>
+        </p:nvSpPr>
+        <p:spPr>
+          <a:xfrm>
+            <a:off x="887506" y="2833789"/>
+            <a:ext cx="2286000" cy="2862322"/>
+          </a:xfrm>
+          <a:prstGeom prst="rect">
+            <a:avLst/>
+          </a:prstGeom>
+          <a:noFill/>
+        </p:spPr>
+        <p:txBody>
+          <a:bodyPr wrap="square" rtlCol="0">
+            <a:spAutoFit/>
+          </a:bodyPr>
+          <a:lstStyle/>
+          <a:p>
+            <a:r>
+              <a:rPr lang="en-US" dirty="0"/>
+              <a:t>12 shared variants between stock virus replicates</a:t>
+            </a:r>
+          </a:p>
+          <a:p>
+            <a:endParaRPr lang="en-US" dirty="0"/>
+          </a:p>
+          <a:p>
+            <a:r>
+              <a:rPr lang="en-US" dirty="0"/>
+              <a:t>High frequency single variants belong to higher diluted stock virus samples</a:t>
+            </a:r>
+          </a:p>
+          <a:p>
+            <a:r>
+              <a:rPr lang="en-US" dirty="0"/>
+              <a:t>= GOOD!</a:t>
+            </a:r>
+          </a:p>
+        </p:txBody>
+      </p:sp>
       <p:pic>
         <p:nvPicPr>
-          <p:cNvPr id="4" name="Picture 3">
-            <a:extLst>
-              <a:ext uri="{FF2B5EF4-FFF2-40B4-BE49-F238E27FC236}">
-                <a16:creationId xmlns:a16="http://schemas.microsoft.com/office/drawing/2014/main" id="{A13CC9D0-1E93-0D33-8676-A8305C1A3B24}"/>
+          <p:cNvPr id="6" name="Picture 5">
+            <a:extLst>
+              <a:ext uri="{FF2B5EF4-FFF2-40B4-BE49-F238E27FC236}">
+                <a16:creationId xmlns:a16="http://schemas.microsoft.com/office/drawing/2014/main" id="{0A194B8C-B2FF-6516-F8B3-1C92622197F3}"/>
               </a:ext>
             </a:extLst>
           </p:cNvPr>
@@ -4957,64 +4879,14 @@
         </p:blipFill>
         <p:spPr>
           <a:xfrm>
-            <a:off x="3810000" y="620389"/>
-            <a:ext cx="7772400" cy="5617221"/>
+            <a:off x="3803073" y="508353"/>
+            <a:ext cx="7772400" cy="5841294"/>
           </a:xfrm>
           <a:prstGeom prst="rect">
             <a:avLst/>
           </a:prstGeom>
         </p:spPr>
       </p:pic>
-      <p:sp>
-        <p:nvSpPr>
-          <p:cNvPr id="2" name="TextBox 1">
-            <a:extLst>
-              <a:ext uri="{FF2B5EF4-FFF2-40B4-BE49-F238E27FC236}">
-                <a16:creationId xmlns:a16="http://schemas.microsoft.com/office/drawing/2014/main" id="{2218F814-1F6F-7C8C-86C3-A96A18989998}"/>
-              </a:ext>
-            </a:extLst>
-          </p:cNvPr>
-          <p:cNvSpPr txBox="1"/>
-          <p:nvPr/>
-        </p:nvSpPr>
-        <p:spPr>
-          <a:xfrm>
-            <a:off x="887506" y="2833789"/>
-            <a:ext cx="2286000" cy="2862322"/>
-          </a:xfrm>
-          <a:prstGeom prst="rect">
-            <a:avLst/>
-          </a:prstGeom>
-          <a:noFill/>
-        </p:spPr>
-        <p:txBody>
-          <a:bodyPr wrap="square" rtlCol="0">
-            <a:spAutoFit/>
-          </a:bodyPr>
-          <a:lstStyle/>
-          <a:p>
-            <a:r>
-              <a:rPr lang="en-US" dirty="0"/>
-              <a:t>11 shared variants between stock virus replicates</a:t>
-            </a:r>
-          </a:p>
-          <a:p>
-            <a:endParaRPr lang="en-US" dirty="0"/>
-          </a:p>
-          <a:p>
-            <a:r>
-              <a:rPr lang="en-US" dirty="0"/>
-              <a:t>High frequency single variants belong to higher diluted stock virus samples</a:t>
-            </a:r>
-          </a:p>
-          <a:p>
-            <a:r>
-              <a:rPr lang="en-US" dirty="0"/>
-              <a:t>= GOOD!</a:t>
-            </a:r>
-          </a:p>
-        </p:txBody>
-      </p:sp>
     </p:spTree>
     <p:extLst>
       <p:ext uri="{BB962C8B-B14F-4D97-AF65-F5344CB8AC3E}">
@@ -5047,10 +4919,10 @@
       </p:grpSpPr>
       <p:pic>
         <p:nvPicPr>
-          <p:cNvPr id="4" name="Picture 3">
-            <a:extLst>
-              <a:ext uri="{FF2B5EF4-FFF2-40B4-BE49-F238E27FC236}">
-                <a16:creationId xmlns:a16="http://schemas.microsoft.com/office/drawing/2014/main" id="{57BD3C61-7E7C-8DE8-AFEB-1C1E93B5AA86}"/>
+          <p:cNvPr id="3" name="Picture 2">
+            <a:extLst>
+              <a:ext uri="{FF2B5EF4-FFF2-40B4-BE49-F238E27FC236}">
+                <a16:creationId xmlns:a16="http://schemas.microsoft.com/office/drawing/2014/main" id="{7DBDA7AE-86A7-5C61-B202-F65160A0C709}"/>
               </a:ext>
             </a:extLst>
           </p:cNvPr>
@@ -5067,8 +4939,8 @@
         </p:blipFill>
         <p:spPr>
           <a:xfrm>
-            <a:off x="2209800" y="551432"/>
-            <a:ext cx="7772400" cy="5755135"/>
+            <a:off x="2209800" y="951787"/>
+            <a:ext cx="7772400" cy="4954426"/>
           </a:xfrm>
           <a:prstGeom prst="rect">
             <a:avLst/>
@@ -5097,7 +4969,7 @@
         </p:blipFill>
         <p:spPr>
           <a:xfrm>
-            <a:off x="6655594" y="3959226"/>
+            <a:off x="7805521" y="4070063"/>
             <a:ext cx="1651000" cy="812800"/>
           </a:xfrm>
           <a:prstGeom prst="rect">
@@ -5170,12 +5042,64 @@
           <a:chExt cx="0" cy="0"/>
         </a:xfrm>
       </p:grpSpPr>
+      <p:sp>
+        <p:nvSpPr>
+          <p:cNvPr id="2" name="TextBox 1">
+            <a:extLst>
+              <a:ext uri="{FF2B5EF4-FFF2-40B4-BE49-F238E27FC236}">
+                <a16:creationId xmlns:a16="http://schemas.microsoft.com/office/drawing/2014/main" id="{8CE8FA0C-0366-6848-2EDD-4166B4D53AE4}"/>
+              </a:ext>
+            </a:extLst>
+          </p:cNvPr>
+          <p:cNvSpPr txBox="1"/>
+          <p:nvPr/>
+        </p:nvSpPr>
+        <p:spPr>
+          <a:xfrm>
+            <a:off x="914400" y="2228671"/>
+            <a:ext cx="2286000" cy="2862322"/>
+          </a:xfrm>
+          <a:prstGeom prst="rect">
+            <a:avLst/>
+          </a:prstGeom>
+          <a:noFill/>
+        </p:spPr>
+        <p:txBody>
+          <a:bodyPr wrap="square" rtlCol="0">
+            <a:spAutoFit/>
+          </a:bodyPr>
+          <a:lstStyle/>
+          <a:p>
+            <a:r>
+              <a:rPr lang="en-US" dirty="0"/>
+              <a:t>No shared variants between synthetic control reps = GOOD!</a:t>
+            </a:r>
+          </a:p>
+          <a:p>
+            <a:endParaRPr lang="en-US" dirty="0"/>
+          </a:p>
+          <a:p>
+            <a:r>
+              <a:rPr lang="en-US" dirty="0"/>
+              <a:t>However, higher frequency single variants seem to belong </a:t>
+            </a:r>
+            <a:r>
+              <a:rPr lang="en-US"/>
+              <a:t>to samples </a:t>
+            </a:r>
+            <a:r>
+              <a:rPr lang="en-US" dirty="0"/>
+              <a:t>with lower dilutions</a:t>
+            </a:r>
+          </a:p>
+        </p:txBody>
+      </p:sp>
       <p:pic>
         <p:nvPicPr>
-          <p:cNvPr id="4" name="Picture 3">
-            <a:extLst>
-              <a:ext uri="{FF2B5EF4-FFF2-40B4-BE49-F238E27FC236}">
-                <a16:creationId xmlns:a16="http://schemas.microsoft.com/office/drawing/2014/main" id="{41563691-4A31-4EEA-0F2A-9BCA529599F3}"/>
+          <p:cNvPr id="3" name="Picture 2">
+            <a:extLst>
+              <a:ext uri="{FF2B5EF4-FFF2-40B4-BE49-F238E27FC236}">
+                <a16:creationId xmlns:a16="http://schemas.microsoft.com/office/drawing/2014/main" id="{A04DEF33-C2B7-B43C-1009-AB1B188D4BCD}"/>
               </a:ext>
             </a:extLst>
           </p:cNvPr>
@@ -5192,66 +5116,14 @@
         </p:blipFill>
         <p:spPr>
           <a:xfrm>
-            <a:off x="3823447" y="653957"/>
-            <a:ext cx="7772400" cy="5550086"/>
+            <a:off x="4109853" y="623578"/>
+            <a:ext cx="7772400" cy="5610844"/>
           </a:xfrm>
           <a:prstGeom prst="rect">
             <a:avLst/>
           </a:prstGeom>
         </p:spPr>
       </p:pic>
-      <p:sp>
-        <p:nvSpPr>
-          <p:cNvPr id="2" name="TextBox 1">
-            <a:extLst>
-              <a:ext uri="{FF2B5EF4-FFF2-40B4-BE49-F238E27FC236}">
-                <a16:creationId xmlns:a16="http://schemas.microsoft.com/office/drawing/2014/main" id="{8CE8FA0C-0366-6848-2EDD-4166B4D53AE4}"/>
-              </a:ext>
-            </a:extLst>
-          </p:cNvPr>
-          <p:cNvSpPr txBox="1"/>
-          <p:nvPr/>
-        </p:nvSpPr>
-        <p:spPr>
-          <a:xfrm>
-            <a:off x="914400" y="2228671"/>
-            <a:ext cx="2286000" cy="2862322"/>
-          </a:xfrm>
-          <a:prstGeom prst="rect">
-            <a:avLst/>
-          </a:prstGeom>
-          <a:noFill/>
-        </p:spPr>
-        <p:txBody>
-          <a:bodyPr wrap="square" rtlCol="0">
-            <a:spAutoFit/>
-          </a:bodyPr>
-          <a:lstStyle/>
-          <a:p>
-            <a:r>
-              <a:rPr lang="en-US" dirty="0"/>
-              <a:t>No shared variants between synthetic control reps = GOOD!</a:t>
-            </a:r>
-          </a:p>
-          <a:p>
-            <a:endParaRPr lang="en-US" dirty="0"/>
-          </a:p>
-          <a:p>
-            <a:r>
-              <a:rPr lang="en-US" dirty="0"/>
-              <a:t>However, higher frequency single variants seem to belong </a:t>
-            </a:r>
-            <a:r>
-              <a:rPr lang="en-US"/>
-              <a:t>to samples </a:t>
-            </a:r>
-            <a:r>
-              <a:rPr lang="en-US" dirty="0"/>
-              <a:t>with lower dilutions</a:t>
-            </a:r>
-          </a:p>
-        </p:txBody>
-      </p:sp>
     </p:spTree>
     <p:extLst>
       <p:ext uri="{BB962C8B-B14F-4D97-AF65-F5344CB8AC3E}">
@@ -5282,12 +5154,82 @@
           <a:chExt cx="0" cy="0"/>
         </a:xfrm>
       </p:grpSpPr>
+      <p:sp>
+        <p:nvSpPr>
+          <p:cNvPr id="8" name="TextBox 7">
+            <a:extLst>
+              <a:ext uri="{FF2B5EF4-FFF2-40B4-BE49-F238E27FC236}">
+                <a16:creationId xmlns:a16="http://schemas.microsoft.com/office/drawing/2014/main" id="{F665738D-5D5B-FF50-203B-FCF7A2ECBD3B}"/>
+              </a:ext>
+            </a:extLst>
+          </p:cNvPr>
+          <p:cNvSpPr txBox="1"/>
+          <p:nvPr/>
+        </p:nvSpPr>
+        <p:spPr>
+          <a:xfrm>
+            <a:off x="7737759" y="2590800"/>
+            <a:ext cx="789711" cy="369332"/>
+          </a:xfrm>
+          <a:prstGeom prst="rect">
+            <a:avLst/>
+          </a:prstGeom>
+          <a:noFill/>
+        </p:spPr>
+        <p:txBody>
+          <a:bodyPr wrap="square" rtlCol="0">
+            <a:spAutoFit/>
+          </a:bodyPr>
+          <a:lstStyle/>
+          <a:p>
+            <a:r>
+              <a:rPr lang="en-US" dirty="0"/>
+              <a:t>stock</a:t>
+            </a:r>
+          </a:p>
+        </p:txBody>
+      </p:sp>
+      <p:sp>
+        <p:nvSpPr>
+          <p:cNvPr id="9" name="TextBox 8">
+            <a:extLst>
+              <a:ext uri="{FF2B5EF4-FFF2-40B4-BE49-F238E27FC236}">
+                <a16:creationId xmlns:a16="http://schemas.microsoft.com/office/drawing/2014/main" id="{6C680BFA-7520-108B-87D5-B76B0E1D057E}"/>
+              </a:ext>
+            </a:extLst>
+          </p:cNvPr>
+          <p:cNvSpPr txBox="1"/>
+          <p:nvPr/>
+        </p:nvSpPr>
+        <p:spPr>
+          <a:xfrm>
+            <a:off x="2698376" y="2590800"/>
+            <a:ext cx="789711" cy="369332"/>
+          </a:xfrm>
+          <a:prstGeom prst="rect">
+            <a:avLst/>
+          </a:prstGeom>
+          <a:noFill/>
+        </p:spPr>
+        <p:txBody>
+          <a:bodyPr wrap="square" rtlCol="0">
+            <a:spAutoFit/>
+          </a:bodyPr>
+          <a:lstStyle/>
+          <a:p>
+            <a:r>
+              <a:rPr lang="en-US" dirty="0"/>
+              <a:t>syn</a:t>
+            </a:r>
+          </a:p>
+        </p:txBody>
+      </p:sp>
       <p:pic>
         <p:nvPicPr>
-          <p:cNvPr id="4" name="Picture 3">
-            <a:extLst>
-              <a:ext uri="{FF2B5EF4-FFF2-40B4-BE49-F238E27FC236}">
-                <a16:creationId xmlns:a16="http://schemas.microsoft.com/office/drawing/2014/main" id="{DDCC9D7B-5C84-9F50-60BB-514072DD3E7E}"/>
+          <p:cNvPr id="3" name="Picture 2">
+            <a:extLst>
+              <a:ext uri="{FF2B5EF4-FFF2-40B4-BE49-F238E27FC236}">
+                <a16:creationId xmlns:a16="http://schemas.microsoft.com/office/drawing/2014/main" id="{53337493-5B14-A339-C560-9F20A2110BC0}"/>
               </a:ext>
             </a:extLst>
           </p:cNvPr>
@@ -5304,8 +5246,8 @@
         </p:blipFill>
         <p:spPr>
           <a:xfrm>
-            <a:off x="4588096" y="254244"/>
-            <a:ext cx="3015807" cy="1971874"/>
+            <a:off x="4454242" y="307581"/>
+            <a:ext cx="2873707" cy="2283219"/>
           </a:xfrm>
           <a:prstGeom prst="rect">
             <a:avLst/>
@@ -5314,10 +5256,10 @@
       </p:pic>
       <p:pic>
         <p:nvPicPr>
-          <p:cNvPr id="7" name="Picture 6">
-            <a:extLst>
-              <a:ext uri="{FF2B5EF4-FFF2-40B4-BE49-F238E27FC236}">
-                <a16:creationId xmlns:a16="http://schemas.microsoft.com/office/drawing/2014/main" id="{65F1217D-3C9B-CF29-C902-038D82A385D8}"/>
+          <p:cNvPr id="5" name="Picture 4">
+            <a:extLst>
+              <a:ext uri="{FF2B5EF4-FFF2-40B4-BE49-F238E27FC236}">
+                <a16:creationId xmlns:a16="http://schemas.microsoft.com/office/drawing/2014/main" id="{F750C957-BBBB-0D57-7AEE-975D2F430074}"/>
               </a:ext>
             </a:extLst>
           </p:cNvPr>
@@ -5334,90 +5276,20 @@
         </p:blipFill>
         <p:spPr>
           <a:xfrm>
-            <a:off x="6914570" y="3060456"/>
-            <a:ext cx="3225800" cy="3543300"/>
+            <a:off x="6198750" y="3089563"/>
+            <a:ext cx="5075538" cy="3157682"/>
           </a:xfrm>
           <a:prstGeom prst="rect">
             <a:avLst/>
           </a:prstGeom>
         </p:spPr>
       </p:pic>
-      <p:sp>
-        <p:nvSpPr>
-          <p:cNvPr id="8" name="TextBox 7">
-            <a:extLst>
-              <a:ext uri="{FF2B5EF4-FFF2-40B4-BE49-F238E27FC236}">
-                <a16:creationId xmlns:a16="http://schemas.microsoft.com/office/drawing/2014/main" id="{F665738D-5D5B-FF50-203B-FCF7A2ECBD3B}"/>
-              </a:ext>
-            </a:extLst>
-          </p:cNvPr>
-          <p:cNvSpPr txBox="1"/>
-          <p:nvPr/>
-        </p:nvSpPr>
-        <p:spPr>
-          <a:xfrm>
-            <a:off x="7737759" y="2590800"/>
-            <a:ext cx="789711" cy="369332"/>
-          </a:xfrm>
-          <a:prstGeom prst="rect">
-            <a:avLst/>
-          </a:prstGeom>
-          <a:noFill/>
-        </p:spPr>
-        <p:txBody>
-          <a:bodyPr wrap="square" rtlCol="0">
-            <a:spAutoFit/>
-          </a:bodyPr>
-          <a:lstStyle/>
-          <a:p>
-            <a:r>
-              <a:rPr lang="en-US" dirty="0"/>
-              <a:t>stock</a:t>
-            </a:r>
-          </a:p>
-        </p:txBody>
-      </p:sp>
-      <p:sp>
-        <p:nvSpPr>
-          <p:cNvPr id="9" name="TextBox 8">
-            <a:extLst>
-              <a:ext uri="{FF2B5EF4-FFF2-40B4-BE49-F238E27FC236}">
-                <a16:creationId xmlns:a16="http://schemas.microsoft.com/office/drawing/2014/main" id="{6C680BFA-7520-108B-87D5-B76B0E1D057E}"/>
-              </a:ext>
-            </a:extLst>
-          </p:cNvPr>
-          <p:cNvSpPr txBox="1"/>
-          <p:nvPr/>
-        </p:nvSpPr>
-        <p:spPr>
-          <a:xfrm>
-            <a:off x="2698376" y="2590800"/>
-            <a:ext cx="789711" cy="369332"/>
-          </a:xfrm>
-          <a:prstGeom prst="rect">
-            <a:avLst/>
-          </a:prstGeom>
-          <a:noFill/>
-        </p:spPr>
-        <p:txBody>
-          <a:bodyPr wrap="square" rtlCol="0">
-            <a:spAutoFit/>
-          </a:bodyPr>
-          <a:lstStyle/>
-          <a:p>
-            <a:r>
-              <a:rPr lang="en-US" dirty="0"/>
-              <a:t>syn</a:t>
-            </a:r>
-          </a:p>
-        </p:txBody>
-      </p:sp>
       <p:pic>
         <p:nvPicPr>
-          <p:cNvPr id="10" name="Picture 9">
-            <a:extLst>
-              <a:ext uri="{FF2B5EF4-FFF2-40B4-BE49-F238E27FC236}">
-                <a16:creationId xmlns:a16="http://schemas.microsoft.com/office/drawing/2014/main" id="{9FE0576C-CC03-8F06-D0B9-83A0D41700A5}"/>
+          <p:cNvPr id="6" name="Picture 5">
+            <a:extLst>
+              <a:ext uri="{FF2B5EF4-FFF2-40B4-BE49-F238E27FC236}">
+                <a16:creationId xmlns:a16="http://schemas.microsoft.com/office/drawing/2014/main" id="{C2F75957-CEBC-C82F-0C6B-DC70C392E034}"/>
               </a:ext>
             </a:extLst>
           </p:cNvPr>
@@ -5434,8 +5306,8 @@
         </p:blipFill>
         <p:spPr>
           <a:xfrm>
-            <a:off x="1721431" y="3196421"/>
-            <a:ext cx="3556000" cy="2654300"/>
+            <a:off x="2059337" y="3089563"/>
+            <a:ext cx="2857500" cy="2794000"/>
           </a:xfrm>
           <a:prstGeom prst="rect">
             <a:avLst/>
@@ -5472,12 +5344,47 @@
           <a:chExt cx="0" cy="0"/>
         </a:xfrm>
       </p:grpSpPr>
+      <p:sp>
+        <p:nvSpPr>
+          <p:cNvPr id="2" name="TextBox 1">
+            <a:extLst>
+              <a:ext uri="{FF2B5EF4-FFF2-40B4-BE49-F238E27FC236}">
+                <a16:creationId xmlns:a16="http://schemas.microsoft.com/office/drawing/2014/main" id="{D59C35A0-3075-5466-4ABE-BA74AEE59BB1}"/>
+              </a:ext>
+            </a:extLst>
+          </p:cNvPr>
+          <p:cNvSpPr txBox="1"/>
+          <p:nvPr/>
+        </p:nvSpPr>
+        <p:spPr>
+          <a:xfrm>
+            <a:off x="4545106" y="107655"/>
+            <a:ext cx="4814047" cy="369332"/>
+          </a:xfrm>
+          <a:prstGeom prst="rect">
+            <a:avLst/>
+          </a:prstGeom>
+          <a:noFill/>
+        </p:spPr>
+        <p:txBody>
+          <a:bodyPr wrap="square" rtlCol="0">
+            <a:spAutoFit/>
+          </a:bodyPr>
+          <a:lstStyle/>
+          <a:p>
+            <a:r>
+              <a:rPr lang="en-US" dirty="0"/>
+              <a:t>Frequency of variants per replicate</a:t>
+            </a:r>
+          </a:p>
+        </p:txBody>
+      </p:sp>
       <p:pic>
         <p:nvPicPr>
-          <p:cNvPr id="4" name="Picture 3">
-            <a:extLst>
-              <a:ext uri="{FF2B5EF4-FFF2-40B4-BE49-F238E27FC236}">
-                <a16:creationId xmlns:a16="http://schemas.microsoft.com/office/drawing/2014/main" id="{D110D539-20FB-E86E-B3C6-F408686586EE}"/>
+          <p:cNvPr id="7" name="Picture 6">
+            <a:extLst>
+              <a:ext uri="{FF2B5EF4-FFF2-40B4-BE49-F238E27FC236}">
+                <a16:creationId xmlns:a16="http://schemas.microsoft.com/office/drawing/2014/main" id="{7D2151C4-608E-E4FB-784F-CB1C7522A6B2}"/>
               </a:ext>
             </a:extLst>
           </p:cNvPr>
@@ -5494,8 +5401,8 @@
         </p:blipFill>
         <p:spPr>
           <a:xfrm>
-            <a:off x="0" y="584563"/>
-            <a:ext cx="5747904" cy="4598323"/>
+            <a:off x="359709" y="792949"/>
+            <a:ext cx="5525994" cy="4258093"/>
           </a:xfrm>
           <a:prstGeom prst="rect">
             <a:avLst/>
@@ -5504,10 +5411,10 @@
       </p:pic>
       <p:pic>
         <p:nvPicPr>
-          <p:cNvPr id="5" name="Picture 4">
-            <a:extLst>
-              <a:ext uri="{FF2B5EF4-FFF2-40B4-BE49-F238E27FC236}">
-                <a16:creationId xmlns:a16="http://schemas.microsoft.com/office/drawing/2014/main" id="{DBD8EC77-157A-046F-94EE-EC4FDA0667F5}"/>
+          <p:cNvPr id="8" name="Picture 7">
+            <a:extLst>
+              <a:ext uri="{FF2B5EF4-FFF2-40B4-BE49-F238E27FC236}">
+                <a16:creationId xmlns:a16="http://schemas.microsoft.com/office/drawing/2014/main" id="{51F464AE-E53C-B5AA-9AA9-C65F7E11D6C7}"/>
               </a:ext>
             </a:extLst>
           </p:cNvPr>
@@ -5524,55 +5431,20 @@
         </p:blipFill>
         <p:spPr>
           <a:xfrm>
-            <a:off x="6096000" y="584563"/>
-            <a:ext cx="5897653" cy="4674867"/>
+            <a:off x="5885703" y="737139"/>
+            <a:ext cx="5703624" cy="4369712"/>
           </a:xfrm>
           <a:prstGeom prst="rect">
             <a:avLst/>
           </a:prstGeom>
         </p:spPr>
       </p:pic>
-      <p:sp>
-        <p:nvSpPr>
-          <p:cNvPr id="2" name="TextBox 1">
-            <a:extLst>
-              <a:ext uri="{FF2B5EF4-FFF2-40B4-BE49-F238E27FC236}">
-                <a16:creationId xmlns:a16="http://schemas.microsoft.com/office/drawing/2014/main" id="{D59C35A0-3075-5466-4ABE-BA74AEE59BB1}"/>
-              </a:ext>
-            </a:extLst>
-          </p:cNvPr>
-          <p:cNvSpPr txBox="1"/>
-          <p:nvPr/>
-        </p:nvSpPr>
-        <p:spPr>
-          <a:xfrm>
-            <a:off x="4545106" y="107655"/>
-            <a:ext cx="4814047" cy="369332"/>
-          </a:xfrm>
-          <a:prstGeom prst="rect">
-            <a:avLst/>
-          </a:prstGeom>
-          <a:noFill/>
-        </p:spPr>
-        <p:txBody>
-          <a:bodyPr wrap="square" rtlCol="0">
-            <a:spAutoFit/>
-          </a:bodyPr>
-          <a:lstStyle/>
-          <a:p>
-            <a:r>
-              <a:rPr lang="en-US" dirty="0"/>
-              <a:t>Frequency of variants per replicate</a:t>
-            </a:r>
-          </a:p>
-        </p:txBody>
-      </p:sp>
       <p:pic>
         <p:nvPicPr>
-          <p:cNvPr id="3" name="Picture 2">
-            <a:extLst>
-              <a:ext uri="{FF2B5EF4-FFF2-40B4-BE49-F238E27FC236}">
-                <a16:creationId xmlns:a16="http://schemas.microsoft.com/office/drawing/2014/main" id="{1B07CD41-CDE4-8543-24F4-2DC766C1EC0F}"/>
+          <p:cNvPr id="9" name="Picture 8">
+            <a:extLst>
+              <a:ext uri="{FF2B5EF4-FFF2-40B4-BE49-F238E27FC236}">
+                <a16:creationId xmlns:a16="http://schemas.microsoft.com/office/drawing/2014/main" id="{4E6A96CC-BA9D-8778-AC1C-13457D2C11C3}"/>
               </a:ext>
             </a:extLst>
           </p:cNvPr>
@@ -5590,7 +5462,7 @@
         <p:spPr>
           <a:xfrm>
             <a:off x="1700306" y="5599580"/>
-            <a:ext cx="2844800" cy="876300"/>
+            <a:ext cx="2679700" cy="901700"/>
           </a:xfrm>
           <a:prstGeom prst="rect">
             <a:avLst/>
@@ -5599,10 +5471,10 @@
       </p:pic>
       <p:pic>
         <p:nvPicPr>
-          <p:cNvPr id="6" name="Picture 5">
-            <a:extLst>
-              <a:ext uri="{FF2B5EF4-FFF2-40B4-BE49-F238E27FC236}">
-                <a16:creationId xmlns:a16="http://schemas.microsoft.com/office/drawing/2014/main" id="{69EC9CDD-E497-A545-5FF4-98C15836A7A0}"/>
+          <p:cNvPr id="10" name="Picture 9">
+            <a:extLst>
+              <a:ext uri="{FF2B5EF4-FFF2-40B4-BE49-F238E27FC236}">
+                <a16:creationId xmlns:a16="http://schemas.microsoft.com/office/drawing/2014/main" id="{292A7806-949B-686F-A922-F27DC6B2A226}"/>
               </a:ext>
             </a:extLst>
           </p:cNvPr>
@@ -5619,8 +5491,8 @@
         </p:blipFill>
         <p:spPr>
           <a:xfrm>
-            <a:off x="7735794" y="5599580"/>
-            <a:ext cx="2755900" cy="901700"/>
+            <a:off x="7545294" y="5599580"/>
+            <a:ext cx="2946400" cy="901700"/>
           </a:xfrm>
           <a:prstGeom prst="rect">
             <a:avLst/>
@@ -5659,10 +5531,10 @@
       </p:grpSpPr>
       <p:pic>
         <p:nvPicPr>
-          <p:cNvPr id="4" name="Picture 3">
-            <a:extLst>
-              <a:ext uri="{FF2B5EF4-FFF2-40B4-BE49-F238E27FC236}">
-                <a16:creationId xmlns:a16="http://schemas.microsoft.com/office/drawing/2014/main" id="{4848E52F-460F-0D36-B0F4-E6E4CC966506}"/>
+          <p:cNvPr id="2" name="Picture 1">
+            <a:extLst>
+              <a:ext uri="{FF2B5EF4-FFF2-40B4-BE49-F238E27FC236}">
+                <a16:creationId xmlns:a16="http://schemas.microsoft.com/office/drawing/2014/main" id="{D36518C4-4584-9389-B1DF-F28C57DE78E3}"/>
               </a:ext>
             </a:extLst>
           </p:cNvPr>
@@ -5679,8 +5551,8 @@
         </p:blipFill>
         <p:spPr>
           <a:xfrm>
-            <a:off x="2209800" y="582068"/>
-            <a:ext cx="7772400" cy="5693863"/>
+            <a:off x="2209800" y="718139"/>
+            <a:ext cx="7772400" cy="5421722"/>
           </a:xfrm>
           <a:prstGeom prst="rect">
             <a:avLst/>
@@ -5719,72 +5591,88 @@
       </p:grpSpPr>
       <p:sp>
         <p:nvSpPr>
-          <p:cNvPr id="2" name="Title 1">
-            <a:extLst>
-              <a:ext uri="{FF2B5EF4-FFF2-40B4-BE49-F238E27FC236}">
-                <a16:creationId xmlns:a16="http://schemas.microsoft.com/office/drawing/2014/main" id="{640D9E7C-E110-75DD-9C7E-3E3B81AE9358}"/>
-              </a:ext>
-            </a:extLst>
-          </p:cNvPr>
-          <p:cNvSpPr>
-            <a:spLocks noGrp="1"/>
-          </p:cNvSpPr>
-          <p:nvPr>
-            <p:ph type="title"/>
-          </p:nvPr>
-        </p:nvSpPr>
-        <p:spPr>
-          <a:xfrm>
-            <a:off x="838200" y="0"/>
-            <a:ext cx="10515600" cy="1325563"/>
-          </a:xfrm>
-        </p:spPr>
-        <p:txBody>
-          <a:bodyPr/>
-          <a:lstStyle/>
-          <a:p>
-            <a:r>
-              <a:rPr lang="en-US"/>
-              <a:t>SNVs shared </a:t>
-            </a:r>
+          <p:cNvPr id="5" name="TextBox 4">
+            <a:extLst>
+              <a:ext uri="{FF2B5EF4-FFF2-40B4-BE49-F238E27FC236}">
+                <a16:creationId xmlns:a16="http://schemas.microsoft.com/office/drawing/2014/main" id="{24C71A6C-F601-A3F9-31FA-806176505BED}"/>
+              </a:ext>
+            </a:extLst>
+          </p:cNvPr>
+          <p:cNvSpPr txBox="1"/>
+          <p:nvPr/>
+        </p:nvSpPr>
+        <p:spPr>
+          <a:xfrm>
+            <a:off x="4926106" y="1813152"/>
+            <a:ext cx="2877670" cy="369332"/>
+          </a:xfrm>
+          <a:prstGeom prst="rect">
+            <a:avLst/>
+          </a:prstGeom>
+          <a:noFill/>
+        </p:spPr>
+        <p:txBody>
+          <a:bodyPr wrap="square" rtlCol="0">
+            <a:spAutoFit/>
+          </a:bodyPr>
+          <a:lstStyle/>
+          <a:p>
             <a:r>
               <a:rPr lang="en-US" dirty="0"/>
-              <a:t>between replicates</a:t>
-            </a:r>
-          </a:p>
-        </p:txBody>
-      </p:sp>
-      <p:sp>
-        <p:nvSpPr>
-          <p:cNvPr id="3" name="Content Placeholder 2">
-            <a:extLst>
-              <a:ext uri="{FF2B5EF4-FFF2-40B4-BE49-F238E27FC236}">
-                <a16:creationId xmlns:a16="http://schemas.microsoft.com/office/drawing/2014/main" id="{3CCD5F57-3E32-842C-DB12-A8E07DEFA804}"/>
-              </a:ext>
-            </a:extLst>
-          </p:cNvPr>
-          <p:cNvSpPr>
-            <a:spLocks noGrp="1"/>
-          </p:cNvSpPr>
-          <p:nvPr>
-            <p:ph idx="1"/>
-          </p:nvPr>
-        </p:nvSpPr>
-        <p:spPr/>
-        <p:txBody>
-          <a:bodyPr/>
-          <a:lstStyle/>
-          <a:p>
-            <a:endParaRPr lang="en-US" dirty="0"/>
+              <a:t>in stock viruses</a:t>
+            </a:r>
+          </a:p>
+        </p:txBody>
+      </p:sp>
+      <p:sp>
+        <p:nvSpPr>
+          <p:cNvPr id="6" name="TextBox 5">
+            <a:extLst>
+              <a:ext uri="{FF2B5EF4-FFF2-40B4-BE49-F238E27FC236}">
+                <a16:creationId xmlns:a16="http://schemas.microsoft.com/office/drawing/2014/main" id="{739178A3-A72E-6F6E-D118-AB592B2E2290}"/>
+              </a:ext>
+            </a:extLst>
+          </p:cNvPr>
+          <p:cNvSpPr txBox="1"/>
+          <p:nvPr/>
+        </p:nvSpPr>
+        <p:spPr>
+          <a:xfrm>
+            <a:off x="4074459" y="5513402"/>
+            <a:ext cx="4249270" cy="923330"/>
+          </a:xfrm>
+          <a:prstGeom prst="rect">
+            <a:avLst/>
+          </a:prstGeom>
+          <a:noFill/>
+        </p:spPr>
+        <p:txBody>
+          <a:bodyPr wrap="square" rtlCol="0">
+            <a:spAutoFit/>
+          </a:bodyPr>
+          <a:lstStyle/>
+          <a:p>
+            <a:r>
+              <a:rPr lang="en-US" dirty="0"/>
+              <a:t>As the </a:t>
+            </a:r>
+            <a:r>
+              <a:rPr lang="en-US" dirty="0" err="1"/>
+              <a:t>ct</a:t>
+            </a:r>
+            <a:r>
+              <a:rPr lang="en-US" dirty="0"/>
+              <a:t>-value goes up (less virus), the the amount of single variants also goes up! Which is what you want to see</a:t>
+            </a:r>
           </a:p>
         </p:txBody>
       </p:sp>
       <p:pic>
         <p:nvPicPr>
-          <p:cNvPr id="4" name="Picture 3">
-            <a:extLst>
-              <a:ext uri="{FF2B5EF4-FFF2-40B4-BE49-F238E27FC236}">
-                <a16:creationId xmlns:a16="http://schemas.microsoft.com/office/drawing/2014/main" id="{CE7E6DF2-EFAF-6072-32FA-AE943688640B}"/>
+          <p:cNvPr id="2" name="Picture 1">
+            <a:extLst>
+              <a:ext uri="{FF2B5EF4-FFF2-40B4-BE49-F238E27FC236}">
+                <a16:creationId xmlns:a16="http://schemas.microsoft.com/office/drawing/2014/main" id="{E6C4A773-798D-9DA6-F9AE-904EE3A64C88}"/>
               </a:ext>
             </a:extLst>
           </p:cNvPr>
@@ -5801,206 +5689,18 @@
         </p:blipFill>
         <p:spPr>
           <a:xfrm>
-            <a:off x="1911927" y="1284951"/>
-            <a:ext cx="8679873" cy="5207924"/>
+            <a:off x="689214" y="2221075"/>
+            <a:ext cx="10813571" cy="3253735"/>
           </a:xfrm>
           <a:prstGeom prst="rect">
             <a:avLst/>
           </a:prstGeom>
         </p:spPr>
       </p:pic>
-      <p:sp>
-        <p:nvSpPr>
-          <p:cNvPr id="5" name="Rectangle 4">
-            <a:extLst>
-              <a:ext uri="{FF2B5EF4-FFF2-40B4-BE49-F238E27FC236}">
-                <a16:creationId xmlns:a16="http://schemas.microsoft.com/office/drawing/2014/main" id="{ABB2C346-C649-7ECF-E06E-E5650D7278DD}"/>
-              </a:ext>
-            </a:extLst>
-          </p:cNvPr>
-          <p:cNvSpPr/>
-          <p:nvPr/>
-        </p:nvSpPr>
-        <p:spPr>
-          <a:xfrm>
-            <a:off x="8527383" y="2181007"/>
-            <a:ext cx="263236" cy="263237"/>
-          </a:xfrm>
-          <a:prstGeom prst="rect">
-            <a:avLst/>
-          </a:prstGeom>
-          <a:solidFill>
-            <a:srgbClr val="D17542"/>
-          </a:solidFill>
-          <a:ln>
-            <a:solidFill>
-              <a:srgbClr val="D17542"/>
-            </a:solidFill>
-          </a:ln>
-        </p:spPr>
-        <p:style>
-          <a:lnRef idx="2">
-            <a:schemeClr val="accent1">
-              <a:shade val="15000"/>
-            </a:schemeClr>
-          </a:lnRef>
-          <a:fillRef idx="1">
-            <a:schemeClr val="accent1"/>
-          </a:fillRef>
-          <a:effectRef idx="0">
-            <a:schemeClr val="accent1"/>
-          </a:effectRef>
-          <a:fontRef idx="minor">
-            <a:schemeClr val="lt1"/>
-          </a:fontRef>
-        </p:style>
-        <p:txBody>
-          <a:bodyPr rtlCol="0" anchor="ctr"/>
-          <a:lstStyle/>
-          <a:p>
-            <a:pPr algn="ctr"/>
-            <a:endParaRPr lang="en-US"/>
-          </a:p>
-        </p:txBody>
-      </p:sp>
-      <p:sp>
-        <p:nvSpPr>
-          <p:cNvPr id="6" name="Rectangle 5">
-            <a:extLst>
-              <a:ext uri="{FF2B5EF4-FFF2-40B4-BE49-F238E27FC236}">
-                <a16:creationId xmlns:a16="http://schemas.microsoft.com/office/drawing/2014/main" id="{69171D10-F8E8-F7D9-7187-DF314C79AD2E}"/>
-              </a:ext>
-            </a:extLst>
-          </p:cNvPr>
-          <p:cNvSpPr/>
-          <p:nvPr/>
-        </p:nvSpPr>
-        <p:spPr>
-          <a:xfrm>
-            <a:off x="8527383" y="2519362"/>
-            <a:ext cx="263236" cy="263237"/>
-          </a:xfrm>
-          <a:prstGeom prst="rect">
-            <a:avLst/>
-          </a:prstGeom>
-          <a:solidFill>
-            <a:srgbClr val="DFB75D"/>
-          </a:solidFill>
-          <a:ln>
-            <a:solidFill>
-              <a:srgbClr val="DFB75D"/>
-            </a:solidFill>
-          </a:ln>
-        </p:spPr>
-        <p:style>
-          <a:lnRef idx="2">
-            <a:schemeClr val="accent1">
-              <a:shade val="15000"/>
-            </a:schemeClr>
-          </a:lnRef>
-          <a:fillRef idx="1">
-            <a:schemeClr val="accent1"/>
-          </a:fillRef>
-          <a:effectRef idx="0">
-            <a:schemeClr val="accent1"/>
-          </a:effectRef>
-          <a:fontRef idx="minor">
-            <a:schemeClr val="lt1"/>
-          </a:fontRef>
-        </p:style>
-        <p:txBody>
-          <a:bodyPr rtlCol="0" anchor="ctr"/>
-          <a:lstStyle/>
-          <a:p>
-            <a:pPr algn="ctr"/>
-            <a:endParaRPr lang="en-US"/>
-          </a:p>
-        </p:txBody>
-      </p:sp>
-      <p:sp>
-        <p:nvSpPr>
-          <p:cNvPr id="7" name="TextBox 6">
-            <a:extLst>
-              <a:ext uri="{FF2B5EF4-FFF2-40B4-BE49-F238E27FC236}">
-                <a16:creationId xmlns:a16="http://schemas.microsoft.com/office/drawing/2014/main" id="{39D9A017-43EB-B55E-696F-2F520FF9C0E0}"/>
-              </a:ext>
-            </a:extLst>
-          </p:cNvPr>
-          <p:cNvSpPr txBox="1"/>
-          <p:nvPr/>
-        </p:nvSpPr>
-        <p:spPr>
-          <a:xfrm>
-            <a:off x="8790620" y="2129611"/>
-            <a:ext cx="1367041" cy="369332"/>
-          </a:xfrm>
-          <a:prstGeom prst="rect">
-            <a:avLst/>
-          </a:prstGeom>
-          <a:noFill/>
-        </p:spPr>
-        <p:txBody>
-          <a:bodyPr wrap="square" rtlCol="0">
-            <a:spAutoFit/>
-          </a:bodyPr>
-          <a:lstStyle/>
-          <a:p>
-            <a:r>
-              <a:rPr lang="en-US" dirty="0"/>
-              <a:t> </a:t>
-            </a:r>
-            <a:r>
-              <a:rPr lang="en-US" dirty="0">
-                <a:latin typeface="Arial" panose="020B0604020202020204" pitchFamily="34" charset="0"/>
-                <a:cs typeface="Arial" panose="020B0604020202020204" pitchFamily="34" charset="0"/>
-              </a:rPr>
-              <a:t>nonsyn</a:t>
-            </a:r>
-          </a:p>
-        </p:txBody>
-      </p:sp>
-      <p:sp>
-        <p:nvSpPr>
-          <p:cNvPr id="8" name="TextBox 7">
-            <a:extLst>
-              <a:ext uri="{FF2B5EF4-FFF2-40B4-BE49-F238E27FC236}">
-                <a16:creationId xmlns:a16="http://schemas.microsoft.com/office/drawing/2014/main" id="{3B0BF41B-B0C2-2E5D-FB0D-628AC42D3DCA}"/>
-              </a:ext>
-            </a:extLst>
-          </p:cNvPr>
-          <p:cNvSpPr txBox="1"/>
-          <p:nvPr/>
-        </p:nvSpPr>
-        <p:spPr>
-          <a:xfrm>
-            <a:off x="8790619" y="2424957"/>
-            <a:ext cx="1367041" cy="369332"/>
-          </a:xfrm>
-          <a:prstGeom prst="rect">
-            <a:avLst/>
-          </a:prstGeom>
-          <a:noFill/>
-        </p:spPr>
-        <p:txBody>
-          <a:bodyPr wrap="square" rtlCol="0">
-            <a:spAutoFit/>
-          </a:bodyPr>
-          <a:lstStyle/>
-          <a:p>
-            <a:r>
-              <a:rPr lang="en-US" dirty="0">
-                <a:latin typeface="Arial" panose="020B0604020202020204" pitchFamily="34" charset="0"/>
-                <a:cs typeface="Arial" panose="020B0604020202020204" pitchFamily="34" charset="0"/>
-              </a:rPr>
-              <a:t> syn</a:t>
-            </a:r>
-          </a:p>
-        </p:txBody>
-      </p:sp>
     </p:spTree>
     <p:extLst>
       <p:ext uri="{BB962C8B-B14F-4D97-AF65-F5344CB8AC3E}">
-        <p14:creationId xmlns:p14="http://schemas.microsoft.com/office/powerpoint/2010/main" val="1034356065"/>
+        <p14:creationId xmlns:p14="http://schemas.microsoft.com/office/powerpoint/2010/main" val="758918281"/>
       </p:ext>
     </p:extLst>
   </p:cSld>

</xml_diff>